<commit_message>
revise count-2pair-again.pptx, extend gray-edges2.pptx
</commit_message>
<xml_diff>
--- a/fall15/slidesF15/count-2pair-again.pptx
+++ b/fall15/slidesF15/count-2pair-again.pptx
@@ -5,10 +5,10 @@
     <p:sldMasterId id="2147483650" r:id="rId1"/>
   </p:sldMasterIdLst>
   <p:notesMasterIdLst>
-    <p:notesMasterId r:id="rId11"/>
+    <p:notesMasterId r:id="rId12"/>
   </p:notesMasterIdLst>
   <p:handoutMasterIdLst>
-    <p:handoutMasterId r:id="rId12"/>
+    <p:handoutMasterId r:id="rId13"/>
   </p:handoutMasterIdLst>
   <p:sldIdLst>
     <p:sldId id="322" r:id="rId2"/>
@@ -19,12 +19,13 @@
     <p:sldId id="400" r:id="rId7"/>
     <p:sldId id="401" r:id="rId8"/>
     <p:sldId id="402" r:id="rId9"/>
-    <p:sldId id="379" r:id="rId10"/>
+    <p:sldId id="403" r:id="rId10"/>
+    <p:sldId id="379" r:id="rId11"/>
   </p:sldIdLst>
   <p:sldSz cx="9144000" cy="6858000" type="screen4x3"/>
   <p:notesSz cx="9601200" cy="7315200"/>
   <p:custDataLst>
-    <p:tags r:id="rId14"/>
+    <p:tags r:id="rId15"/>
   </p:custDataLst>
   <p:defaultTextStyle>
     <a:defPPr>
@@ -1113,6 +1114,96 @@
     <p:extLst>
       <p:ext uri="{BB962C8B-B14F-4D97-AF65-F5344CB8AC3E}">
         <p14:creationId xmlns:p14="http://schemas.microsoft.com/office/powerpoint/2010/main" val="3697671650"/>
+      </p:ext>
+    </p:extLst>
+  </p:cSld>
+  <p:clrMapOvr>
+    <a:masterClrMapping/>
+  </p:clrMapOvr>
+</p:notes>
+</file>
+
+<file path=ppt/notesSlides/notesSlide4.xml><?xml version="1.0" encoding="utf-8"?>
+<p:notes xmlns:a="http://schemas.openxmlformats.org/drawingml/2006/main" xmlns:r="http://schemas.openxmlformats.org/officeDocument/2006/relationships" xmlns:p="http://schemas.openxmlformats.org/presentationml/2006/main">
+  <p:cSld>
+    <p:spTree>
+      <p:nvGrpSpPr>
+        <p:cNvPr id="1" name=""/>
+        <p:cNvGrpSpPr/>
+        <p:nvPr/>
+      </p:nvGrpSpPr>
+      <p:grpSpPr>
+        <a:xfrm>
+          <a:off x="0" y="0"/>
+          <a:ext cx="0" cy="0"/>
+          <a:chOff x="0" y="0"/>
+          <a:chExt cx="0" cy="0"/>
+        </a:xfrm>
+      </p:grpSpPr>
+      <p:sp>
+        <p:nvSpPr>
+          <p:cNvPr id="2" name="Slide Image Placeholder 1"/>
+          <p:cNvSpPr>
+            <a:spLocks noGrp="1" noRot="1" noChangeAspect="1"/>
+          </p:cNvSpPr>
+          <p:nvPr>
+            <p:ph type="sldImg"/>
+          </p:nvPr>
+        </p:nvSpPr>
+        <p:spPr/>
+      </p:sp>
+      <p:sp>
+        <p:nvSpPr>
+          <p:cNvPr id="3" name="Notes Placeholder 2"/>
+          <p:cNvSpPr>
+            <a:spLocks noGrp="1"/>
+          </p:cNvSpPr>
+          <p:nvPr>
+            <p:ph type="body" idx="1"/>
+          </p:nvPr>
+        </p:nvSpPr>
+        <p:spPr/>
+        <p:txBody>
+          <a:bodyPr/>
+          <a:lstStyle/>
+          <a:p>
+            <a:endParaRPr lang="en-US"/>
+          </a:p>
+        </p:txBody>
+      </p:sp>
+      <p:sp>
+        <p:nvSpPr>
+          <p:cNvPr id="4" name="Slide Number Placeholder 3"/>
+          <p:cNvSpPr>
+            <a:spLocks noGrp="1"/>
+          </p:cNvSpPr>
+          <p:nvPr>
+            <p:ph type="sldNum" sz="quarter" idx="10"/>
+          </p:nvPr>
+        </p:nvSpPr>
+        <p:spPr/>
+        <p:txBody>
+          <a:bodyPr/>
+          <a:lstStyle/>
+          <a:p>
+            <a:pPr>
+              <a:defRPr/>
+            </a:pPr>
+            <a:fld id="{E43B162F-3006-4669-9143-B86E3D04398E}" type="slidenum">
+              <a:rPr lang="en-US" smtClean="0"/>
+              <a:pPr>
+                <a:defRPr/>
+              </a:pPr>
+              <a:t>9</a:t>
+            </a:fld>
+            <a:endParaRPr lang="en-US"/>
+          </a:p>
+        </p:txBody>
+      </p:sp>
+    </p:spTree>
+    <p:extLst>
+      <p:ext uri="{BB962C8B-B14F-4D97-AF65-F5344CB8AC3E}">
+        <p14:creationId xmlns:p14="http://schemas.microsoft.com/office/powerpoint/2010/main" val="3222875856"/>
       </p:ext>
     </p:extLst>
   </p:cSld>
@@ -2566,6 +2657,679 @@
 </p:sld>
 </file>
 
+<file path=ppt/slides/slide10.xml><?xml version="1.0" encoding="utf-8"?>
+<p:sld xmlns:a="http://schemas.openxmlformats.org/drawingml/2006/main" xmlns:r="http://schemas.openxmlformats.org/officeDocument/2006/relationships" xmlns:p="http://schemas.openxmlformats.org/presentationml/2006/main">
+  <p:cSld>
+    <p:spTree>
+      <p:nvGrpSpPr>
+        <p:cNvPr id="1" name=""/>
+        <p:cNvGrpSpPr/>
+        <p:nvPr/>
+      </p:nvGrpSpPr>
+      <p:grpSpPr>
+        <a:xfrm>
+          <a:off x="0" y="0"/>
+          <a:ext cx="0" cy="0"/>
+          <a:chOff x="0" y="0"/>
+          <a:chExt cx="0" cy="0"/>
+        </a:xfrm>
+      </p:grpSpPr>
+      <p:sp>
+        <p:nvSpPr>
+          <p:cNvPr id="2" name="Title 1"/>
+          <p:cNvSpPr>
+            <a:spLocks noGrp="1"/>
+          </p:cNvSpPr>
+          <p:nvPr>
+            <p:ph type="title"/>
+          </p:nvPr>
+        </p:nvSpPr>
+        <p:spPr/>
+        <p:txBody>
+          <a:bodyPr/>
+          <a:lstStyle/>
+          <a:p>
+            <a:r>
+              <a:rPr lang="en-US" dirty="0" smtClean="0"/>
+              <a:t>Counting 2-pair poker hands</a:t>
+            </a:r>
+            <a:endParaRPr lang="en-US" dirty="0"/>
+          </a:p>
+        </p:txBody>
+      </p:sp>
+      <p:sp>
+        <p:nvSpPr>
+          <p:cNvPr id="3" name="Content Placeholder 2"/>
+          <p:cNvSpPr>
+            <a:spLocks noGrp="1"/>
+          </p:cNvSpPr>
+          <p:nvPr>
+            <p:ph idx="1"/>
+          </p:nvPr>
+        </p:nvSpPr>
+        <p:spPr>
+          <a:xfrm>
+            <a:off x="76200" y="1250950"/>
+            <a:ext cx="9067800" cy="4999038"/>
+          </a:xfrm>
+        </p:spPr>
+        <p:txBody>
+          <a:bodyPr/>
+          <a:lstStyle/>
+          <a:p>
+            <a:r>
+              <a:rPr lang="en-US" sz="4400" dirty="0" smtClean="0">
+                <a:solidFill>
+                  <a:srgbClr val="000000"/>
+                </a:solidFill>
+              </a:rPr>
+              <a:t>and so </a:t>
+            </a:r>
+            <a:r>
+              <a:rPr lang="en-US" sz="4400" dirty="0" smtClean="0">
+                <a:solidFill>
+                  <a:srgbClr val="0000FF"/>
+                </a:solidFill>
+              </a:rPr>
+              <a:t># 2-pair hands</a:t>
+            </a:r>
+            <a:r>
+              <a:rPr lang="en-US" sz="4400" dirty="0" smtClean="0">
+                <a:solidFill>
+                  <a:srgbClr val="000000"/>
+                </a:solidFill>
+              </a:rPr>
+              <a:t> is</a:t>
+            </a:r>
+          </a:p>
+          <a:p>
+            <a:r>
+              <a:rPr lang="en-US" dirty="0" smtClean="0">
+                <a:solidFill>
+                  <a:srgbClr val="000000"/>
+                </a:solidFill>
+              </a:rPr>
+              <a:t>  #rank 2-</a:t>
+            </a:r>
+            <a:r>
+              <a:rPr lang="en-US" dirty="0">
+                <a:solidFill>
+                  <a:srgbClr val="000000"/>
+                </a:solidFill>
+              </a:rPr>
+              <a:t>sets ・</a:t>
+            </a:r>
+            <a:r>
+              <a:rPr lang="en-US" dirty="0" smtClean="0">
+                <a:solidFill>
+                  <a:prstClr val="black"/>
+                </a:solidFill>
+                <a:latin typeface="CambriaMath"/>
+              </a:rPr>
+              <a:t> </a:t>
+            </a:r>
+            <a:r>
+              <a:rPr lang="en-US" dirty="0" smtClean="0">
+                <a:solidFill>
+                  <a:srgbClr val="000000"/>
+                </a:solidFill>
+              </a:rPr>
+              <a:t>#suit 2-</a:t>
+            </a:r>
+            <a:r>
+              <a:rPr lang="en-US" dirty="0">
+                <a:solidFill>
+                  <a:srgbClr val="000000"/>
+                </a:solidFill>
+              </a:rPr>
+              <a:t>sets ・</a:t>
+            </a:r>
+            <a:endParaRPr lang="en-US" dirty="0" smtClean="0">
+              <a:solidFill>
+                <a:prstClr val="black"/>
+              </a:solidFill>
+              <a:latin typeface="CambriaMath"/>
+            </a:endParaRPr>
+          </a:p>
+          <a:p>
+            <a:r>
+              <a:rPr lang="en-US" dirty="0" smtClean="0">
+                <a:solidFill>
+                  <a:srgbClr val="000000"/>
+                </a:solidFill>
+              </a:rPr>
+              <a:t>  #suit 2-</a:t>
+            </a:r>
+            <a:r>
+              <a:rPr lang="en-US" dirty="0">
+                <a:solidFill>
+                  <a:srgbClr val="000000"/>
+                </a:solidFill>
+              </a:rPr>
+              <a:t>sets </a:t>
+            </a:r>
+            <a:r>
+              <a:rPr lang="en-US" dirty="0" smtClean="0">
+                <a:solidFill>
+                  <a:srgbClr val="000000"/>
+                </a:solidFill>
+              </a:rPr>
+              <a:t> ・ </a:t>
+            </a:r>
+            <a:r>
+              <a:rPr lang="en-US" dirty="0" smtClean="0">
+                <a:solidFill>
+                  <a:prstClr val="black"/>
+                </a:solidFill>
+                <a:latin typeface="Comic Sans MS"/>
+                <a:cs typeface="Comic Sans MS"/>
+              </a:rPr>
+              <a:t>#</a:t>
+            </a:r>
+            <a:r>
+              <a:rPr lang="en-US" dirty="0" smtClean="0">
+                <a:solidFill>
+                  <a:prstClr val="black"/>
+                </a:solidFill>
+                <a:latin typeface="Comic Sans MS"/>
+                <a:cs typeface="Comic Sans MS"/>
+              </a:rPr>
+              <a:t>remaining cards</a:t>
+            </a:r>
+            <a:endParaRPr lang="en-US" dirty="0">
+              <a:solidFill>
+                <a:srgbClr val="000000"/>
+              </a:solidFill>
+              <a:latin typeface="Comic Sans MS"/>
+              <a:cs typeface="Comic Sans MS"/>
+            </a:endParaRPr>
+          </a:p>
+        </p:txBody>
+      </p:sp>
+      <p:sp>
+        <p:nvSpPr>
+          <p:cNvPr id="4" name="Slide Number Placeholder 3"/>
+          <p:cNvSpPr>
+            <a:spLocks noGrp="1"/>
+          </p:cNvSpPr>
+          <p:nvPr>
+            <p:ph type="sldNum" sz="quarter" idx="10"/>
+          </p:nvPr>
+        </p:nvSpPr>
+        <p:spPr/>
+        <p:txBody>
+          <a:bodyPr/>
+          <a:lstStyle/>
+          <a:p>
+            <a:pPr>
+              <a:defRPr/>
+            </a:pPr>
+            <a:r>
+              <a:rPr lang="en-US" dirty="0" smtClean="0"/>
+              <a:t>2pair-alt.</a:t>
+            </a:r>
+            <a:fld id="{9C0B6E0F-EDA7-4496-A72F-8E0EBD3F01E4}" type="slidenum">
+              <a:rPr lang="en-US" smtClean="0"/>
+              <a:pPr>
+                <a:defRPr/>
+              </a:pPr>
+              <a:t>10</a:t>
+            </a:fld>
+            <a:endParaRPr lang="en-US" dirty="0"/>
+          </a:p>
+        </p:txBody>
+      </p:sp>
+      <p:graphicFrame>
+        <p:nvGraphicFramePr>
+          <p:cNvPr id="5" name="Object 4"/>
+          <p:cNvGraphicFramePr>
+            <a:graphicFrameLocks noChangeAspect="1"/>
+          </p:cNvGraphicFramePr>
+          <p:nvPr>
+            <p:extLst>
+              <p:ext uri="{D42A27DB-BD31-4B8C-83A1-F6EECF244321}">
+                <p14:modId xmlns:p14="http://schemas.microsoft.com/office/powerpoint/2010/main" val="3188406527"/>
+              </p:ext>
+            </p:extLst>
+          </p:nvPr>
+        </p:nvGraphicFramePr>
+        <p:xfrm>
+          <a:off x="1520825" y="3797300"/>
+          <a:ext cx="6102350" cy="2452688"/>
+        </p:xfrm>
+        <a:graphic>
+          <a:graphicData uri="http://schemas.openxmlformats.org/presentationml/2006/ole">
+            <mc:AlternateContent xmlns:mc="http://schemas.openxmlformats.org/markup-compatibility/2006">
+              <mc:Choice xmlns:v="urn:schemas-microsoft-com:vml" Requires="v">
+                <p:oleObj spid="_x0000_s66611" name="Equation" r:id="rId3" imgW="1295400" imgH="520700" progId="Equation.DSMT4">
+                  <p:embed/>
+                </p:oleObj>
+              </mc:Choice>
+              <mc:Fallback>
+                <p:oleObj name="Equation" r:id="rId3" imgW="1295400" imgH="520700" progId="Equation.DSMT4">
+                  <p:embed/>
+                  <p:pic>
+                    <p:nvPicPr>
+                      <p:cNvPr id="0" name="Picture 2"/>
+                      <p:cNvPicPr>
+                        <a:picLocks noChangeAspect="1" noChangeArrowheads="1"/>
+                      </p:cNvPicPr>
+                      <p:nvPr/>
+                    </p:nvPicPr>
+                    <p:blipFill>
+                      <a:blip r:embed="rId4"/>
+                      <a:srcRect/>
+                      <a:stretch>
+                        <a:fillRect/>
+                      </a:stretch>
+                    </p:blipFill>
+                    <p:spPr bwMode="auto">
+                      <a:xfrm>
+                        <a:off x="1520825" y="3797300"/>
+                        <a:ext cx="6102350" cy="2452688"/>
+                      </a:xfrm>
+                      <a:prstGeom prst="rect">
+                        <a:avLst/>
+                      </a:prstGeom>
+                      <a:noFill/>
+                      <a:extLst>
+                        <a:ext uri="{909E8E84-426E-40dd-AFC4-6F175D3DCCD1}">
+                          <a14:hiddenFill xmlns:a14="http://schemas.microsoft.com/office/drawing/2010/main">
+                            <a:solidFill>
+                              <a:srgbClr val="FFFFFF"/>
+                            </a:solidFill>
+                          </a14:hiddenFill>
+                        </a:ext>
+                      </a:extLst>
+                    </p:spPr>
+                  </p:pic>
+                </p:oleObj>
+              </mc:Fallback>
+            </mc:AlternateContent>
+          </a:graphicData>
+        </a:graphic>
+      </p:graphicFrame>
+      <p:sp>
+        <p:nvSpPr>
+          <p:cNvPr id="8" name="Rectangle 7"/>
+          <p:cNvSpPr/>
+          <p:nvPr/>
+        </p:nvSpPr>
+        <p:spPr>
+          <a:xfrm>
+            <a:off x="7441466" y="4086729"/>
+            <a:ext cx="1114007" cy="1569660"/>
+          </a:xfrm>
+          <a:prstGeom prst="rect">
+            <a:avLst/>
+          </a:prstGeom>
+        </p:spPr>
+        <p:txBody>
+          <a:bodyPr wrap="none">
+            <a:spAutoFit/>
+          </a:bodyPr>
+          <a:lstStyle/>
+          <a:p>
+            <a:r>
+              <a:rPr lang="en-US" sz="9600" dirty="0">
+                <a:solidFill>
+                  <a:srgbClr val="008000"/>
+                </a:solidFill>
+                <a:latin typeface="Zapf Dingbats"/>
+                <a:ea typeface="Zapf Dingbats"/>
+                <a:cs typeface="Zapf Dingbats"/>
+              </a:rPr>
+              <a:t>✓</a:t>
+            </a:r>
+            <a:endParaRPr lang="en-US" sz="9600" dirty="0">
+              <a:solidFill>
+                <a:srgbClr val="008000"/>
+              </a:solidFill>
+            </a:endParaRPr>
+          </a:p>
+        </p:txBody>
+      </p:sp>
+    </p:spTree>
+  </p:cSld>
+  <p:clrMapOvr>
+    <a:masterClrMapping/>
+  </p:clrMapOvr>
+  <mc:AlternateContent xmlns:mc="http://schemas.openxmlformats.org/markup-compatibility/2006" xmlns:p14="http://schemas.microsoft.com/office/powerpoint/2010/main">
+    <mc:Choice Requires="p14">
+      <p:transition spd="slow" p14:dur="900" advClick="0">
+        <p:fade/>
+      </p:transition>
+    </mc:Choice>
+    <mc:Fallback xmlns="">
+      <p:transition xmlns:p14="http://schemas.microsoft.com/office/powerpoint/2010/main" spd="slow" advClick="0">
+        <p:fade/>
+      </p:transition>
+    </mc:Fallback>
+  </mc:AlternateContent>
+  <p:timing>
+    <p:tnLst>
+      <p:par>
+        <p:cTn xmlns:p14="http://schemas.microsoft.com/office/powerpoint/2010/main" id="1" dur="indefinite" restart="never" nodeType="tmRoot">
+          <p:childTnLst>
+            <p:seq concurrent="1" nextAc="seek">
+              <p:cTn id="2" dur="indefinite" nodeType="mainSeq">
+                <p:childTnLst>
+                  <p:par>
+                    <p:cTn id="3" fill="hold">
+                      <p:stCondLst>
+                        <p:cond delay="indefinite"/>
+                      </p:stCondLst>
+                      <p:childTnLst>
+                        <p:par>
+                          <p:cTn id="4" fill="hold">
+                            <p:stCondLst>
+                              <p:cond delay="0"/>
+                            </p:stCondLst>
+                            <p:childTnLst>
+                              <p:par>
+                                <p:cTn id="5" presetID="10" presetClass="entr" presetSubtype="0" fill="hold" nodeType="clickEffect">
+                                  <p:stCondLst>
+                                    <p:cond delay="0"/>
+                                  </p:stCondLst>
+                                  <p:childTnLst>
+                                    <p:set>
+                                      <p:cBhvr>
+                                        <p:cTn id="6" dur="1" fill="hold">
+                                          <p:stCondLst>
+                                            <p:cond delay="0"/>
+                                          </p:stCondLst>
+                                        </p:cTn>
+                                        <p:tgtEl>
+                                          <p:spTgt spid="3">
+                                            <p:txEl>
+                                              <p:pRg st="1" end="1"/>
+                                            </p:txEl>
+                                          </p:spTgt>
+                                        </p:tgtEl>
+                                        <p:attrNameLst>
+                                          <p:attrName>style.visibility</p:attrName>
+                                        </p:attrNameLst>
+                                      </p:cBhvr>
+                                      <p:to>
+                                        <p:strVal val="visible"/>
+                                      </p:to>
+                                    </p:set>
+                                    <p:animEffect transition="in" filter="fade">
+                                      <p:cBhvr>
+                                        <p:cTn id="7" dur="500"/>
+                                        <p:tgtEl>
+                                          <p:spTgt spid="3">
+                                            <p:txEl>
+                                              <p:pRg st="1" end="1"/>
+                                            </p:txEl>
+                                          </p:spTgt>
+                                        </p:tgtEl>
+                                      </p:cBhvr>
+                                    </p:animEffect>
+                                  </p:childTnLst>
+                                </p:cTn>
+                              </p:par>
+                            </p:childTnLst>
+                          </p:cTn>
+                        </p:par>
+                        <p:par>
+                          <p:cTn id="8" fill="hold">
+                            <p:stCondLst>
+                              <p:cond delay="500"/>
+                            </p:stCondLst>
+                            <p:childTnLst>
+                              <p:par>
+                                <p:cTn id="9" presetID="10" presetClass="entr" presetSubtype="0" fill="hold" nodeType="afterEffect">
+                                  <p:stCondLst>
+                                    <p:cond delay="0"/>
+                                  </p:stCondLst>
+                                  <p:childTnLst>
+                                    <p:set>
+                                      <p:cBhvr>
+                                        <p:cTn id="10" dur="1" fill="hold">
+                                          <p:stCondLst>
+                                            <p:cond delay="0"/>
+                                          </p:stCondLst>
+                                        </p:cTn>
+                                        <p:tgtEl>
+                                          <p:spTgt spid="3">
+                                            <p:txEl>
+                                              <p:pRg st="2" end="2"/>
+                                            </p:txEl>
+                                          </p:spTgt>
+                                        </p:tgtEl>
+                                        <p:attrNameLst>
+                                          <p:attrName>style.visibility</p:attrName>
+                                        </p:attrNameLst>
+                                      </p:cBhvr>
+                                      <p:to>
+                                        <p:strVal val="visible"/>
+                                      </p:to>
+                                    </p:set>
+                                    <p:animEffect transition="in" filter="fade">
+                                      <p:cBhvr>
+                                        <p:cTn id="11" dur="500"/>
+                                        <p:tgtEl>
+                                          <p:spTgt spid="3">
+                                            <p:txEl>
+                                              <p:pRg st="2" end="2"/>
+                                            </p:txEl>
+                                          </p:spTgt>
+                                        </p:tgtEl>
+                                      </p:cBhvr>
+                                    </p:animEffect>
+                                  </p:childTnLst>
+                                </p:cTn>
+                              </p:par>
+                            </p:childTnLst>
+                          </p:cTn>
+                        </p:par>
+                      </p:childTnLst>
+                    </p:cTn>
+                  </p:par>
+                  <p:par>
+                    <p:cTn id="12" fill="hold">
+                      <p:stCondLst>
+                        <p:cond delay="indefinite"/>
+                      </p:stCondLst>
+                      <p:childTnLst>
+                        <p:par>
+                          <p:cTn id="13" fill="hold">
+                            <p:stCondLst>
+                              <p:cond delay="0"/>
+                            </p:stCondLst>
+                            <p:childTnLst>
+                              <p:par>
+                                <p:cTn id="14" presetID="22" presetClass="entr" presetSubtype="8" fill="hold" nodeType="clickEffect">
+                                  <p:stCondLst>
+                                    <p:cond delay="0"/>
+                                  </p:stCondLst>
+                                  <p:childTnLst>
+                                    <p:set>
+                                      <p:cBhvr>
+                                        <p:cTn id="15" dur="1" fill="hold">
+                                          <p:stCondLst>
+                                            <p:cond delay="0"/>
+                                          </p:stCondLst>
+                                        </p:cTn>
+                                        <p:tgtEl>
+                                          <p:spTgt spid="5"/>
+                                        </p:tgtEl>
+                                        <p:attrNameLst>
+                                          <p:attrName>style.visibility</p:attrName>
+                                        </p:attrNameLst>
+                                      </p:cBhvr>
+                                      <p:to>
+                                        <p:strVal val="visible"/>
+                                      </p:to>
+                                    </p:set>
+                                    <p:animEffect transition="in" filter="wipe(left)">
+                                      <p:cBhvr>
+                                        <p:cTn id="16" dur="2000"/>
+                                        <p:tgtEl>
+                                          <p:spTgt spid="5"/>
+                                        </p:tgtEl>
+                                      </p:cBhvr>
+                                    </p:animEffect>
+                                  </p:childTnLst>
+                                </p:cTn>
+                              </p:par>
+                            </p:childTnLst>
+                          </p:cTn>
+                        </p:par>
+                      </p:childTnLst>
+                    </p:cTn>
+                  </p:par>
+                  <p:par>
+                    <p:cTn id="17" fill="hold">
+                      <p:stCondLst>
+                        <p:cond delay="indefinite"/>
+                      </p:stCondLst>
+                      <p:childTnLst>
+                        <p:par>
+                          <p:cTn id="18" fill="hold">
+                            <p:stCondLst>
+                              <p:cond delay="0"/>
+                            </p:stCondLst>
+                            <p:childTnLst>
+                              <p:par>
+                                <p:cTn id="19" presetID="49" presetClass="entr" presetSubtype="0" decel="100000" fill="hold" grpId="0" nodeType="clickEffect">
+                                  <p:stCondLst>
+                                    <p:cond delay="0"/>
+                                  </p:stCondLst>
+                                  <p:childTnLst>
+                                    <p:set>
+                                      <p:cBhvr>
+                                        <p:cTn id="20" dur="1" fill="hold">
+                                          <p:stCondLst>
+                                            <p:cond delay="0"/>
+                                          </p:stCondLst>
+                                        </p:cTn>
+                                        <p:tgtEl>
+                                          <p:spTgt spid="8"/>
+                                        </p:tgtEl>
+                                        <p:attrNameLst>
+                                          <p:attrName>style.visibility</p:attrName>
+                                        </p:attrNameLst>
+                                      </p:cBhvr>
+                                      <p:to>
+                                        <p:strVal val="visible"/>
+                                      </p:to>
+                                    </p:set>
+                                    <p:anim calcmode="lin" valueType="num">
+                                      <p:cBhvr>
+                                        <p:cTn id="21" dur="1000" fill="hold"/>
+                                        <p:tgtEl>
+                                          <p:spTgt spid="8"/>
+                                        </p:tgtEl>
+                                        <p:attrNameLst>
+                                          <p:attrName>ppt_w</p:attrName>
+                                        </p:attrNameLst>
+                                      </p:cBhvr>
+                                      <p:tavLst>
+                                        <p:tav tm="0">
+                                          <p:val>
+                                            <p:fltVal val="0"/>
+                                          </p:val>
+                                        </p:tav>
+                                        <p:tav tm="100000">
+                                          <p:val>
+                                            <p:strVal val="#ppt_w"/>
+                                          </p:val>
+                                        </p:tav>
+                                      </p:tavLst>
+                                    </p:anim>
+                                    <p:anim calcmode="lin" valueType="num">
+                                      <p:cBhvr>
+                                        <p:cTn id="22" dur="1000" fill="hold"/>
+                                        <p:tgtEl>
+                                          <p:spTgt spid="8"/>
+                                        </p:tgtEl>
+                                        <p:attrNameLst>
+                                          <p:attrName>ppt_h</p:attrName>
+                                        </p:attrNameLst>
+                                      </p:cBhvr>
+                                      <p:tavLst>
+                                        <p:tav tm="0">
+                                          <p:val>
+                                            <p:fltVal val="0"/>
+                                          </p:val>
+                                        </p:tav>
+                                        <p:tav tm="100000">
+                                          <p:val>
+                                            <p:strVal val="#ppt_h"/>
+                                          </p:val>
+                                        </p:tav>
+                                      </p:tavLst>
+                                    </p:anim>
+                                    <p:anim calcmode="lin" valueType="num">
+                                      <p:cBhvr>
+                                        <p:cTn id="23" dur="1000" fill="hold"/>
+                                        <p:tgtEl>
+                                          <p:spTgt spid="8"/>
+                                        </p:tgtEl>
+                                        <p:attrNameLst>
+                                          <p:attrName>style.rotation</p:attrName>
+                                        </p:attrNameLst>
+                                      </p:cBhvr>
+                                      <p:tavLst>
+                                        <p:tav tm="0">
+                                          <p:val>
+                                            <p:fltVal val="360"/>
+                                          </p:val>
+                                        </p:tav>
+                                        <p:tav tm="100000">
+                                          <p:val>
+                                            <p:fltVal val="0"/>
+                                          </p:val>
+                                        </p:tav>
+                                      </p:tavLst>
+                                    </p:anim>
+                                    <p:animEffect transition="in" filter="fade">
+                                      <p:cBhvr>
+                                        <p:cTn id="24" dur="1000"/>
+                                        <p:tgtEl>
+                                          <p:spTgt spid="8"/>
+                                        </p:tgtEl>
+                                      </p:cBhvr>
+                                    </p:animEffect>
+                                  </p:childTnLst>
+                                </p:cTn>
+                              </p:par>
+                            </p:childTnLst>
+                          </p:cTn>
+                        </p:par>
+                      </p:childTnLst>
+                    </p:cTn>
+                  </p:par>
+                </p:childTnLst>
+              </p:cTn>
+              <p:prevCondLst>
+                <p:cond evt="onPrev" delay="0">
+                  <p:tgtEl>
+                    <p:sldTgt/>
+                  </p:tgtEl>
+                </p:cond>
+              </p:prevCondLst>
+              <p:nextCondLst>
+                <p:cond evt="onNext" delay="0">
+                  <p:tgtEl>
+                    <p:sldTgt/>
+                  </p:tgtEl>
+                </p:cond>
+              </p:nextCondLst>
+            </p:seq>
+          </p:childTnLst>
+        </p:cTn>
+      </p:par>
+    </p:tnLst>
+    <p:bldLst>
+      <p:bldP spid="8" grpId="0"/>
+    </p:bldLst>
+  </p:timing>
+</p:sld>
+</file>
+
 <file path=ppt/slides/slide2.xml><?xml version="1.0" encoding="utf-8"?>
 <p:sld xmlns:a="http://schemas.openxmlformats.org/drawingml/2006/main" xmlns:r="http://schemas.openxmlformats.org/officeDocument/2006/relationships" xmlns:p="http://schemas.openxmlformats.org/presentationml/2006/main">
   <p:cSld>
@@ -2618,7 +3382,7 @@
         </p:nvSpPr>
         <p:spPr>
           <a:xfrm>
-            <a:off x="228600" y="1371600"/>
+            <a:off x="152400" y="1371600"/>
             <a:ext cx="8915400" cy="5500688"/>
           </a:xfrm>
         </p:spPr>
@@ -2627,7 +3391,7 @@
           <a:lstStyle/>
           <a:p>
             <a:r>
-              <a:rPr lang="en-US" sz="4400" dirty="0" smtClean="0">
+              <a:rPr lang="en-US" sz="5400" dirty="0" smtClean="0">
                 <a:solidFill>
                   <a:srgbClr val="000000"/>
                 </a:solidFill>
@@ -2635,7 +3399,7 @@
               <a:t>to count, </a:t>
             </a:r>
             <a:r>
-              <a:rPr lang="en-US" sz="4400" dirty="0" smtClean="0">
+              <a:rPr lang="en-US" sz="5400" dirty="0" smtClean="0">
                 <a:solidFill>
                   <a:srgbClr val="0000FF"/>
                 </a:solidFill>
@@ -2643,7 +3407,7 @@
               <a:t>choose</a:t>
             </a:r>
             <a:r>
-              <a:rPr lang="en-US" sz="4400" dirty="0" smtClean="0">
+              <a:rPr lang="en-US" sz="5400" dirty="0" smtClean="0">
                 <a:solidFill>
                   <a:srgbClr val="000000"/>
                 </a:solidFill>
@@ -2653,31 +3417,57 @@
           </a:p>
           <a:p>
             <a:pPr>
-              <a:lnSpc>
-                <a:spcPct val="130000"/>
-              </a:lnSpc>
               <a:buFont typeface="Arial"/>
               <a:buChar char="•"/>
             </a:pPr>
             <a:r>
-              <a:rPr lang="en-US" sz="4400" dirty="0" smtClean="0">
+              <a:rPr lang="en-US" sz="5400" dirty="0" smtClean="0">
+                <a:solidFill>
+                  <a:srgbClr val="A52174"/>
+                </a:solidFill>
+              </a:rPr>
+              <a:t>set</a:t>
+            </a:r>
+            <a:r>
+              <a:rPr lang="en-US" sz="5400" dirty="0" smtClean="0">
                 <a:solidFill>
                   <a:srgbClr val="000000"/>
                 </a:solidFill>
               </a:rPr>
-              <a:t>2 ranks for the pairs </a:t>
+              <a:t> of 2 </a:t>
+            </a:r>
+            <a:r>
+              <a:rPr lang="en-US" sz="5400" dirty="0" smtClean="0">
+                <a:solidFill>
+                  <a:srgbClr val="000000"/>
+                </a:solidFill>
+              </a:rPr>
+              <a:t>ranks </a:t>
+            </a:r>
+            <a:r>
+              <a:rPr lang="en-US" sz="5400" dirty="0" smtClean="0">
+                <a:solidFill>
+                  <a:srgbClr val="000000"/>
+                </a:solidFill>
+              </a:rPr>
+              <a:t>for </a:t>
+            </a:r>
+            <a:r>
+              <a:rPr lang="en-US" sz="5400" dirty="0" smtClean="0">
+                <a:solidFill>
+                  <a:srgbClr val="000000"/>
+                </a:solidFill>
+              </a:rPr>
+              <a:t>pairs </a:t>
             </a:r>
           </a:p>
           <a:p>
             <a:pPr>
-              <a:lnSpc>
-                <a:spcPct val="150000"/>
-              </a:lnSpc>
               <a:buFont typeface="Arial"/>
               <a:buChar char="•"/>
             </a:pPr>
             <a:r>
-              <a:rPr lang="en-US" sz="4400" dirty="0" smtClean="0">
+              <a:rPr lang="en-US" sz="5400" dirty="0" smtClean="0">
                 <a:solidFill>
                   <a:srgbClr val="000000"/>
                 </a:solidFill>
@@ -2685,7 +3475,7 @@
               <a:t>suits for the </a:t>
             </a:r>
             <a:r>
-              <a:rPr lang="en-US" sz="4400" dirty="0" smtClean="0">
+              <a:rPr lang="en-US" sz="5400" dirty="0" smtClean="0">
                 <a:solidFill>
                   <a:srgbClr val="A52174"/>
                 </a:solidFill>
@@ -2693,52 +3483,12 @@
               <a:t>smaller</a:t>
             </a:r>
             <a:r>
-              <a:rPr lang="en-US" sz="4400" dirty="0" smtClean="0">
+              <a:rPr lang="en-US" sz="5400" dirty="0" smtClean="0">
                 <a:solidFill>
                   <a:srgbClr val="000000"/>
                 </a:solidFill>
               </a:rPr>
               <a:t> rank</a:t>
-            </a:r>
-          </a:p>
-          <a:p>
-            <a:pPr>
-              <a:lnSpc>
-                <a:spcPct val="150000"/>
-              </a:lnSpc>
-              <a:spcAft>
-                <a:spcPts val="600"/>
-              </a:spcAft>
-              <a:buFont typeface="Arial"/>
-              <a:buChar char="•"/>
-            </a:pPr>
-            <a:r>
-              <a:rPr lang="en-US" sz="4400" dirty="0" smtClean="0">
-                <a:solidFill>
-                  <a:srgbClr val="000000"/>
-                </a:solidFill>
-              </a:rPr>
-              <a:t>suits for the </a:t>
-            </a:r>
-            <a:r>
-              <a:rPr lang="en-US" sz="4400" dirty="0" smtClean="0">
-                <a:solidFill>
-                  <a:srgbClr val="A52174"/>
-                </a:solidFill>
-              </a:rPr>
-              <a:t>larger </a:t>
-            </a:r>
-            <a:r>
-              <a:rPr lang="en-US" sz="4400" dirty="0" smtClean="0"/>
-              <a:t>r</a:t>
-            </a:r>
-            <a:r>
-              <a:rPr lang="en-US" sz="4400" dirty="0" smtClean="0">
-                <a:solidFill>
-                  <a:srgbClr val="000000"/>
-                </a:solidFill>
-              </a:rPr>
-              <a:t>ank</a:t>
             </a:r>
           </a:p>
           <a:p>
@@ -2750,14 +3500,51 @@
               <a:buChar char="•"/>
             </a:pPr>
             <a:r>
-              <a:rPr lang="en-US" sz="4400" dirty="0" smtClean="0">
+              <a:rPr lang="en-US" sz="5400" dirty="0" smtClean="0">
                 <a:solidFill>
                   <a:srgbClr val="000000"/>
                 </a:solidFill>
               </a:rPr>
+              <a:t>suits for the </a:t>
+            </a:r>
+            <a:r>
+              <a:rPr lang="en-US" sz="5400" dirty="0" smtClean="0">
+                <a:solidFill>
+                  <a:srgbClr val="A52174"/>
+                </a:solidFill>
+              </a:rPr>
+              <a:t>larger </a:t>
+            </a:r>
+            <a:r>
+              <a:rPr lang="en-US" sz="5400" dirty="0" smtClean="0"/>
+              <a:t>r</a:t>
+            </a:r>
+            <a:r>
+              <a:rPr lang="en-US" sz="5400" dirty="0" smtClean="0">
+                <a:solidFill>
+                  <a:srgbClr val="000000"/>
+                </a:solidFill>
+              </a:rPr>
+              <a:t>ank</a:t>
+            </a:r>
+          </a:p>
+          <a:p>
+            <a:pPr>
+              <a:spcAft>
+                <a:spcPts val="600"/>
+              </a:spcAft>
+              <a:buFont typeface="Arial"/>
+              <a:buChar char="•"/>
+            </a:pPr>
+            <a:r>
+              <a:rPr lang="en-US" sz="5400" dirty="0" smtClean="0">
+                <a:solidFill>
+                  <a:srgbClr val="000000"/>
+                </a:solidFill>
+              </a:rPr>
               <a:t>last card</a:t>
             </a:r>
-            <a:endParaRPr lang="en-US" sz="4400" dirty="0">
+            <a:endParaRPr lang="en-US" sz="5400" dirty="0">
               <a:solidFill>
                 <a:srgbClr val="000000"/>
               </a:solidFill>
@@ -2795,274 +3582,6 @@
               <a:t>2</a:t>
             </a:fld>
             <a:endParaRPr lang="en-US" dirty="0"/>
-          </a:p>
-        </p:txBody>
-      </p:sp>
-      <p:graphicFrame>
-        <p:nvGraphicFramePr>
-          <p:cNvPr id="5" name="Object 4"/>
-          <p:cNvGraphicFramePr>
-            <a:graphicFrameLocks noChangeAspect="1"/>
-          </p:cNvGraphicFramePr>
-          <p:nvPr>
-            <p:extLst>
-              <p:ext uri="{D42A27DB-BD31-4B8C-83A1-F6EECF244321}">
-                <p14:modId xmlns:p14="http://schemas.microsoft.com/office/powerpoint/2010/main" val="2040887163"/>
-              </p:ext>
-            </p:extLst>
-          </p:nvPr>
-        </p:nvGraphicFramePr>
-        <p:xfrm>
-          <a:off x="6400800" y="1752600"/>
-          <a:ext cx="1001485" cy="1828800"/>
-        </p:xfrm>
-        <a:graphic>
-          <a:graphicData uri="http://schemas.openxmlformats.org/presentationml/2006/ole">
-            <mc:AlternateContent xmlns:mc="http://schemas.openxmlformats.org/markup-compatibility/2006">
-              <mc:Choice xmlns:v="urn:schemas-microsoft-com:vml" Requires="v">
-                <p:oleObj spid="_x0000_s1052" name="Equation" r:id="rId4" imgW="292100" imgH="533400" progId="Equation.DSMT4">
-                  <p:embed/>
-                </p:oleObj>
-              </mc:Choice>
-              <mc:Fallback>
-                <p:oleObj name="Equation" r:id="rId4" imgW="292100" imgH="533400" progId="Equation.DSMT4">
-                  <p:embed/>
-                  <p:pic>
-                    <p:nvPicPr>
-                      <p:cNvPr id="0" name=""/>
-                      <p:cNvPicPr/>
-                      <p:nvPr/>
-                    </p:nvPicPr>
-                    <p:blipFill>
-                      <a:blip r:embed="rId5"/>
-                      <a:stretch>
-                        <a:fillRect/>
-                      </a:stretch>
-                    </p:blipFill>
-                    <p:spPr>
-                      <a:xfrm>
-                        <a:off x="6400800" y="1752600"/>
-                        <a:ext cx="1001485" cy="1828800"/>
-                      </a:xfrm>
-                      <a:prstGeom prst="rect">
-                        <a:avLst/>
-                      </a:prstGeom>
-                    </p:spPr>
-                  </p:pic>
-                </p:oleObj>
-              </mc:Fallback>
-            </mc:AlternateContent>
-          </a:graphicData>
-        </a:graphic>
-      </p:graphicFrame>
-      <p:graphicFrame>
-        <p:nvGraphicFramePr>
-          <p:cNvPr id="6" name="Object 5"/>
-          <p:cNvGraphicFramePr>
-            <a:graphicFrameLocks noChangeAspect="1"/>
-          </p:cNvGraphicFramePr>
-          <p:nvPr>
-            <p:extLst>
-              <p:ext uri="{D42A27DB-BD31-4B8C-83A1-F6EECF244321}">
-                <p14:modId xmlns:p14="http://schemas.microsoft.com/office/powerpoint/2010/main" val="2018573439"/>
-              </p:ext>
-            </p:extLst>
-          </p:nvPr>
-        </p:nvGraphicFramePr>
-        <p:xfrm>
-          <a:off x="7620000" y="2743200"/>
-          <a:ext cx="758948" cy="1676400"/>
-        </p:xfrm>
-        <a:graphic>
-          <a:graphicData uri="http://schemas.openxmlformats.org/presentationml/2006/ole">
-            <mc:AlternateContent xmlns:mc="http://schemas.openxmlformats.org/markup-compatibility/2006">
-              <mc:Choice xmlns:v="urn:schemas-microsoft-com:vml" Requires="v">
-                <p:oleObj spid="_x0000_s1053" name="Equation" r:id="rId6" imgW="241300" imgH="533400" progId="Equation.DSMT4">
-                  <p:embed/>
-                </p:oleObj>
-              </mc:Choice>
-              <mc:Fallback>
-                <p:oleObj name="Equation" r:id="rId6" imgW="241300" imgH="533400" progId="Equation.DSMT4">
-                  <p:embed/>
-                  <p:pic>
-                    <p:nvPicPr>
-                      <p:cNvPr id="0" name=""/>
-                      <p:cNvPicPr/>
-                      <p:nvPr/>
-                    </p:nvPicPr>
-                    <p:blipFill>
-                      <a:blip r:embed="rId7"/>
-                      <a:stretch>
-                        <a:fillRect/>
-                      </a:stretch>
-                    </p:blipFill>
-                    <p:spPr>
-                      <a:xfrm>
-                        <a:off x="7620000" y="2743200"/>
-                        <a:ext cx="758948" cy="1676400"/>
-                      </a:xfrm>
-                      <a:prstGeom prst="rect">
-                        <a:avLst/>
-                      </a:prstGeom>
-                    </p:spPr>
-                  </p:pic>
-                </p:oleObj>
-              </mc:Fallback>
-            </mc:AlternateContent>
-          </a:graphicData>
-        </a:graphic>
-      </p:graphicFrame>
-      <p:graphicFrame>
-        <p:nvGraphicFramePr>
-          <p:cNvPr id="7" name="Object 6"/>
-          <p:cNvGraphicFramePr>
-            <a:graphicFrameLocks noChangeAspect="1"/>
-          </p:cNvGraphicFramePr>
-          <p:nvPr>
-            <p:extLst>
-              <p:ext uri="{D42A27DB-BD31-4B8C-83A1-F6EECF244321}">
-                <p14:modId xmlns:p14="http://schemas.microsoft.com/office/powerpoint/2010/main" val="2478980923"/>
-              </p:ext>
-            </p:extLst>
-          </p:nvPr>
-        </p:nvGraphicFramePr>
-        <p:xfrm>
-          <a:off x="7699252" y="4267200"/>
-          <a:ext cx="758948" cy="1676400"/>
-        </p:xfrm>
-        <a:graphic>
-          <a:graphicData uri="http://schemas.openxmlformats.org/presentationml/2006/ole">
-            <mc:AlternateContent xmlns:mc="http://schemas.openxmlformats.org/markup-compatibility/2006">
-              <mc:Choice xmlns:v="urn:schemas-microsoft-com:vml" Requires="v">
-                <p:oleObj spid="_x0000_s1054" name="Equation" r:id="rId8" imgW="241300" imgH="533400" progId="Equation.DSMT4">
-                  <p:embed/>
-                </p:oleObj>
-              </mc:Choice>
-              <mc:Fallback>
-                <p:oleObj name="Equation" r:id="rId8" imgW="241300" imgH="533400" progId="Equation.DSMT4">
-                  <p:embed/>
-                  <p:pic>
-                    <p:nvPicPr>
-                      <p:cNvPr id="0" name=""/>
-                      <p:cNvPicPr/>
-                      <p:nvPr/>
-                    </p:nvPicPr>
-                    <p:blipFill>
-                      <a:blip r:embed="rId7"/>
-                      <a:stretch>
-                        <a:fillRect/>
-                      </a:stretch>
-                    </p:blipFill>
-                    <p:spPr>
-                      <a:xfrm>
-                        <a:off x="7699252" y="4267200"/>
-                        <a:ext cx="758948" cy="1676400"/>
-                      </a:xfrm>
-                      <a:prstGeom prst="rect">
-                        <a:avLst/>
-                      </a:prstGeom>
-                    </p:spPr>
-                  </p:pic>
-                </p:oleObj>
-              </mc:Fallback>
-            </mc:AlternateContent>
-          </a:graphicData>
-        </a:graphic>
-      </p:graphicFrame>
-      <p:sp>
-        <p:nvSpPr>
-          <p:cNvPr id="8" name="TextBox 7"/>
-          <p:cNvSpPr txBox="1"/>
-          <p:nvPr/>
-        </p:nvSpPr>
-        <p:spPr>
-          <a:xfrm>
-            <a:off x="3657600" y="5555159"/>
-            <a:ext cx="4096995" cy="769441"/>
-          </a:xfrm>
-          <a:prstGeom prst="rect">
-            <a:avLst/>
-          </a:prstGeom>
-          <a:noFill/>
-        </p:spPr>
-        <p:txBody>
-          <a:bodyPr wrap="none" rtlCol="0">
-            <a:spAutoFit/>
-          </a:bodyPr>
-          <a:lstStyle/>
-          <a:p>
-            <a:r>
-              <a:rPr lang="en-US" sz="4400" dirty="0">
-                <a:solidFill>
-                  <a:srgbClr val="000000"/>
-                </a:solidFill>
-              </a:rPr>
-              <a:t>      </a:t>
-            </a:r>
-            <a:r>
-              <a:rPr lang="en-US" sz="4400" dirty="0">
-                <a:solidFill>
-                  <a:srgbClr val="000000"/>
-                </a:solidFill>
-                <a:latin typeface="Comic Sans MS"/>
-                <a:cs typeface="Comic Sans MS"/>
-              </a:rPr>
-              <a:t>52 </a:t>
-            </a:r>
-            <a:r>
-              <a:rPr lang="en-US" sz="4400" b="1" dirty="0">
-                <a:solidFill>
-                  <a:srgbClr val="000000"/>
-                </a:solidFill>
-                <a:latin typeface="Comic Sans MS"/>
-                <a:cs typeface="Comic Sans MS"/>
-              </a:rPr>
-              <a:t>– </a:t>
-            </a:r>
-            <a:r>
-              <a:rPr lang="en-US" sz="4400" dirty="0" smtClean="0">
-                <a:solidFill>
-                  <a:srgbClr val="000000"/>
-                </a:solidFill>
-                <a:latin typeface="Comic Sans MS"/>
-                <a:cs typeface="Comic Sans MS"/>
-              </a:rPr>
-              <a:t>8 </a:t>
-            </a:r>
-            <a:r>
-              <a:rPr lang="en-US" sz="4400" b="1" dirty="0">
-                <a:solidFill>
-                  <a:srgbClr val="000000"/>
-                </a:solidFill>
-                <a:latin typeface="Comic Sans MS"/>
-                <a:cs typeface="Comic Sans MS"/>
-              </a:rPr>
-              <a:t>=</a:t>
-            </a:r>
-            <a:r>
-              <a:rPr lang="en-US" sz="4400" dirty="0">
-                <a:solidFill>
-                  <a:srgbClr val="000000"/>
-                </a:solidFill>
-                <a:latin typeface="Comic Sans MS"/>
-                <a:cs typeface="Comic Sans MS"/>
-              </a:rPr>
-              <a:t> </a:t>
-            </a:r>
-            <a:r>
-              <a:rPr lang="en-US" sz="4400" dirty="0" smtClean="0">
-                <a:solidFill>
-                  <a:srgbClr val="000000"/>
-                </a:solidFill>
-                <a:latin typeface="Comic Sans MS"/>
-                <a:cs typeface="Comic Sans MS"/>
-              </a:rPr>
-              <a:t>44</a:t>
-            </a:r>
-            <a:endParaRPr lang="en-US" sz="4400" dirty="0">
-              <a:latin typeface="Comic Sans MS"/>
-              <a:cs typeface="Comic Sans MS"/>
-            </a:endParaRPr>
           </a:p>
         </p:txBody>
       </p:sp>
@@ -3335,226 +3854,6 @@
                       </p:childTnLst>
                     </p:cTn>
                   </p:par>
-                  <p:par>
-                    <p:cTn id="23" fill="hold">
-                      <p:stCondLst>
-                        <p:cond delay="indefinite"/>
-                      </p:stCondLst>
-                      <p:childTnLst>
-                        <p:par>
-                          <p:cTn id="24" fill="hold">
-                            <p:stCondLst>
-                              <p:cond delay="0"/>
-                            </p:stCondLst>
-                            <p:childTnLst>
-                              <p:par>
-                                <p:cTn id="25" presetID="9" presetClass="entr" presetSubtype="0" fill="hold" nodeType="clickEffect">
-                                  <p:stCondLst>
-                                    <p:cond delay="0"/>
-                                  </p:stCondLst>
-                                  <p:childTnLst>
-                                    <p:set>
-                                      <p:cBhvr>
-                                        <p:cTn id="26" dur="1" fill="hold">
-                                          <p:stCondLst>
-                                            <p:cond delay="0"/>
-                                          </p:stCondLst>
-                                        </p:cTn>
-                                        <p:tgtEl>
-                                          <p:spTgt spid="5"/>
-                                        </p:tgtEl>
-                                        <p:attrNameLst>
-                                          <p:attrName>style.visibility</p:attrName>
-                                        </p:attrNameLst>
-                                      </p:cBhvr>
-                                      <p:to>
-                                        <p:strVal val="visible"/>
-                                      </p:to>
-                                    </p:set>
-                                    <p:animEffect transition="in" filter="dissolve">
-                                      <p:cBhvr>
-                                        <p:cTn id="27" dur="500"/>
-                                        <p:tgtEl>
-                                          <p:spTgt spid="5"/>
-                                        </p:tgtEl>
-                                      </p:cBhvr>
-                                    </p:animEffect>
-                                  </p:childTnLst>
-                                </p:cTn>
-                              </p:par>
-                            </p:childTnLst>
-                          </p:cTn>
-                        </p:par>
-                      </p:childTnLst>
-                    </p:cTn>
-                  </p:par>
-                  <p:par>
-                    <p:cTn id="28" fill="hold">
-                      <p:stCondLst>
-                        <p:cond delay="indefinite"/>
-                      </p:stCondLst>
-                      <p:childTnLst>
-                        <p:par>
-                          <p:cTn id="29" fill="hold">
-                            <p:stCondLst>
-                              <p:cond delay="0"/>
-                            </p:stCondLst>
-                            <p:childTnLst>
-                              <p:par>
-                                <p:cTn id="30" presetID="9" presetClass="entr" presetSubtype="0" fill="hold" nodeType="clickEffect">
-                                  <p:stCondLst>
-                                    <p:cond delay="0"/>
-                                  </p:stCondLst>
-                                  <p:childTnLst>
-                                    <p:set>
-                                      <p:cBhvr>
-                                        <p:cTn id="31" dur="1" fill="hold">
-                                          <p:stCondLst>
-                                            <p:cond delay="0"/>
-                                          </p:stCondLst>
-                                        </p:cTn>
-                                        <p:tgtEl>
-                                          <p:spTgt spid="6"/>
-                                        </p:tgtEl>
-                                        <p:attrNameLst>
-                                          <p:attrName>style.visibility</p:attrName>
-                                        </p:attrNameLst>
-                                      </p:cBhvr>
-                                      <p:to>
-                                        <p:strVal val="visible"/>
-                                      </p:to>
-                                    </p:set>
-                                    <p:animEffect transition="in" filter="dissolve">
-                                      <p:cBhvr>
-                                        <p:cTn id="32" dur="500"/>
-                                        <p:tgtEl>
-                                          <p:spTgt spid="6"/>
-                                        </p:tgtEl>
-                                      </p:cBhvr>
-                                    </p:animEffect>
-                                  </p:childTnLst>
-                                </p:cTn>
-                              </p:par>
-                            </p:childTnLst>
-                          </p:cTn>
-                        </p:par>
-                      </p:childTnLst>
-                    </p:cTn>
-                  </p:par>
-                  <p:par>
-                    <p:cTn id="33" fill="hold">
-                      <p:stCondLst>
-                        <p:cond delay="indefinite"/>
-                      </p:stCondLst>
-                      <p:childTnLst>
-                        <p:par>
-                          <p:cTn id="34" fill="hold">
-                            <p:stCondLst>
-                              <p:cond delay="0"/>
-                            </p:stCondLst>
-                            <p:childTnLst>
-                              <p:par>
-                                <p:cTn id="35" presetID="9" presetClass="entr" presetSubtype="0" fill="hold" nodeType="clickEffect">
-                                  <p:stCondLst>
-                                    <p:cond delay="0"/>
-                                  </p:stCondLst>
-                                  <p:childTnLst>
-                                    <p:set>
-                                      <p:cBhvr>
-                                        <p:cTn id="36" dur="1" fill="hold">
-                                          <p:stCondLst>
-                                            <p:cond delay="0"/>
-                                          </p:stCondLst>
-                                        </p:cTn>
-                                        <p:tgtEl>
-                                          <p:spTgt spid="7"/>
-                                        </p:tgtEl>
-                                        <p:attrNameLst>
-                                          <p:attrName>style.visibility</p:attrName>
-                                        </p:attrNameLst>
-                                      </p:cBhvr>
-                                      <p:to>
-                                        <p:strVal val="visible"/>
-                                      </p:to>
-                                    </p:set>
-                                    <p:animEffect transition="in" filter="dissolve">
-                                      <p:cBhvr>
-                                        <p:cTn id="37" dur="500"/>
-                                        <p:tgtEl>
-                                          <p:spTgt spid="7"/>
-                                        </p:tgtEl>
-                                      </p:cBhvr>
-                                    </p:animEffect>
-                                  </p:childTnLst>
-                                </p:cTn>
-                              </p:par>
-                            </p:childTnLst>
-                          </p:cTn>
-                        </p:par>
-                      </p:childTnLst>
-                    </p:cTn>
-                  </p:par>
-                  <p:par>
-                    <p:cTn id="38" fill="hold">
-                      <p:stCondLst>
-                        <p:cond delay="indefinite"/>
-                      </p:stCondLst>
-                      <p:childTnLst>
-                        <p:par>
-                          <p:cTn id="39" fill="hold">
-                            <p:stCondLst>
-                              <p:cond delay="0"/>
-                            </p:stCondLst>
-                            <p:childTnLst>
-                              <p:par>
-                                <p:cTn id="40" presetID="22" presetClass="entr" presetSubtype="8" fill="hold" nodeType="clickEffect">
-                                  <p:stCondLst>
-                                    <p:cond delay="0"/>
-                                  </p:stCondLst>
-                                  <p:childTnLst>
-                                    <p:set>
-                                      <p:cBhvr>
-                                        <p:cTn id="41" dur="1" fill="hold">
-                                          <p:stCondLst>
-                                            <p:cond delay="0"/>
-                                          </p:stCondLst>
-                                        </p:cTn>
-                                        <p:tgtEl>
-                                          <p:spTgt spid="8">
-                                            <p:txEl>
-                                              <p:pRg st="0" end="0"/>
-                                            </p:txEl>
-                                          </p:spTgt>
-                                        </p:tgtEl>
-                                        <p:attrNameLst>
-                                          <p:attrName>style.visibility</p:attrName>
-                                        </p:attrNameLst>
-                                      </p:cBhvr>
-                                      <p:to>
-                                        <p:strVal val="visible"/>
-                                      </p:to>
-                                    </p:set>
-                                    <p:animEffect transition="in" filter="wipe(left)">
-                                      <p:cBhvr>
-                                        <p:cTn id="42" dur="1000"/>
-                                        <p:tgtEl>
-                                          <p:spTgt spid="8">
-                                            <p:txEl>
-                                              <p:pRg st="0" end="0"/>
-                                            </p:txEl>
-                                          </p:spTgt>
-                                        </p:tgtEl>
-                                      </p:cBhvr>
-                                    </p:animEffect>
-                                  </p:childTnLst>
-                                </p:cTn>
-                              </p:par>
-                            </p:childTnLst>
-                          </p:cTn>
-                        </p:par>
-                      </p:childTnLst>
-                    </p:cTn>
-                  </p:par>
                 </p:childTnLst>
               </p:cTn>
               <p:prevCondLst>
@@ -6022,7 +6321,18 @@
                 <a:latin typeface="Comic Sans MS"/>
                 <a:cs typeface="Comic Sans MS"/>
               </a:rPr>
-              <a:t>pair ranks:          {</a:t>
+              <a:t>two </a:t>
+            </a:r>
+            <a:r>
+              <a:rPr lang="en-US" dirty="0" smtClean="0">
+                <a:solidFill>
+                  <a:srgbClr val="000000"/>
+                </a:solidFill>
+                <a:effectLst/>
+                <a:latin typeface="Comic Sans MS"/>
+                <a:cs typeface="Comic Sans MS"/>
+              </a:rPr>
+              <a:t>ranks:          {</a:t>
             </a:r>
             <a:r>
               <a:rPr lang="en-US" dirty="0" smtClean="0">
@@ -6241,10 +6551,6 @@
               </a:rPr>
               <a:t>}</a:t>
             </a:r>
-            <a:endParaRPr lang="en-US" dirty="0" smtClean="0">
-              <a:latin typeface="Comic Sans MS"/>
-              <a:cs typeface="Comic Sans MS"/>
-            </a:endParaRPr>
           </a:p>
           <a:p>
             <a:pPr marL="571500" indent="-571500">
@@ -6771,7 +7077,7 @@
         <p:spPr>
           <a:xfrm>
             <a:off x="304800" y="1371600"/>
-            <a:ext cx="8458200" cy="4191000"/>
+            <a:ext cx="8686800" cy="4114800"/>
           </a:xfrm>
         </p:spPr>
         <p:txBody>
@@ -6792,7 +7098,7 @@
                   </a:schemeClr>
                 </a:solidFill>
               </a:rPr>
-              <a:t>[pairs </a:t>
+              <a:t>[2-set </a:t>
             </a:r>
             <a:r>
               <a:rPr lang="en-US" dirty="0">
@@ -6823,7 +7129,7 @@
                 </a:solidFill>
                 <a:latin typeface="CambriaMath"/>
               </a:rPr>
-              <a:t>⨯[</a:t>
+              <a:t>⨯</a:t>
             </a:r>
             <a:r>
               <a:rPr lang="en-US" dirty="0" smtClean="0">
@@ -6832,51 +7138,62 @@
                     <a:lumMod val="50000"/>
                   </a:schemeClr>
                 </a:solidFill>
-              </a:rPr>
-              <a:t>pairs </a:t>
-            </a:r>
-            <a:r>
-              <a:rPr lang="en-US" dirty="0">
+                <a:latin typeface="CambriaMath"/>
+              </a:rPr>
+              <a:t>[</a:t>
+            </a:r>
+            <a:r>
+              <a:rPr lang="en-US" dirty="0" smtClean="0">
                 <a:solidFill>
                   <a:schemeClr val="accent1">
                     <a:lumMod val="50000"/>
                   </a:schemeClr>
                 </a:solidFill>
               </a:rPr>
-              <a:t>of </a:t>
-            </a:r>
-            <a:r>
-              <a:rPr lang="en-US" dirty="0" smtClean="0">
+              <a:t>2-set </a:t>
+            </a:r>
+            <a:r>
+              <a:rPr lang="en-US" dirty="0">
                 <a:solidFill>
                   <a:schemeClr val="accent1">
                     <a:lumMod val="50000"/>
                   </a:schemeClr>
                 </a:solidFill>
               </a:rPr>
-              <a:t>suits] </a:t>
-            </a:r>
-            <a:r>
-              <a:rPr lang="en-US" dirty="0">
+              <a:t>of </a:t>
+            </a:r>
+            <a:r>
+              <a:rPr lang="en-US" dirty="0" smtClean="0">
                 <a:solidFill>
                   <a:schemeClr val="accent1">
                     <a:lumMod val="50000"/>
                   </a:schemeClr>
                 </a:solidFill>
-                <a:latin typeface="CambriaMath"/>
-              </a:rPr>
-              <a:t>⨯</a:t>
-            </a:r>
-          </a:p>
-          <a:p>
-            <a:r>
-              <a:rPr lang="en-US" dirty="0" smtClean="0">
+              </a:rPr>
+              <a:t>suits] </a:t>
+            </a:r>
+            <a:r>
+              <a:rPr lang="en-US" dirty="0">
                 <a:solidFill>
                   <a:schemeClr val="accent1">
                     <a:lumMod val="50000"/>
                   </a:schemeClr>
                 </a:solidFill>
-              </a:rPr>
-              <a:t>[pairs </a:t>
+                <a:latin typeface="CambriaMath"/>
+              </a:rPr>
+              <a:t>⨯</a:t>
+            </a:r>
+          </a:p>
+          <a:p>
+            <a:r>
+              <a:rPr lang="en-US" dirty="0" smtClean="0">
+                <a:solidFill>
+                  <a:schemeClr val="accent1">
+                    <a:lumMod val="50000"/>
+                  </a:schemeClr>
+                </a:solidFill>
+              </a:rPr>
+              <a:t>[2-set </a:t>
             </a:r>
             <a:r>
               <a:rPr lang="en-US" dirty="0">
@@ -7129,30 +7446,21 @@
                             </p:childTnLst>
                           </p:cTn>
                         </p:par>
-                      </p:childTnLst>
-                    </p:cTn>
-                  </p:par>
-                  <p:par>
-                    <p:cTn id="8" fill="hold">
-                      <p:stCondLst>
-                        <p:cond delay="indefinite"/>
-                      </p:stCondLst>
-                      <p:childTnLst>
                         <p:par>
-                          <p:cTn id="9" fill="hold">
+                          <p:cTn id="8" fill="hold">
                             <p:stCondLst>
-                              <p:cond delay="0"/>
+                              <p:cond delay="1000"/>
                             </p:stCondLst>
                             <p:childTnLst>
                               <p:par>
-                                <p:cTn id="10" presetID="22" presetClass="entr" presetSubtype="8" fill="hold" nodeType="clickEffect">
+                                <p:cTn id="9" presetID="22" presetClass="entr" presetSubtype="8" fill="hold" nodeType="afterEffect">
                                   <p:stCondLst>
                                     <p:cond delay="0"/>
                                   </p:stCondLst>
                                   <p:childTnLst>
                                     <p:set>
                                       <p:cBhvr>
-                                        <p:cTn id="11" dur="1" fill="hold">
+                                        <p:cTn id="10" dur="1" fill="hold">
                                           <p:stCondLst>
                                             <p:cond delay="0"/>
                                           </p:stCondLst>
@@ -7174,7 +7482,7 @@
                                     </p:set>
                                     <p:animEffect transition="in" filter="wipe(left)">
                                       <p:cBhvr>
-                                        <p:cTn id="12" dur="1000"/>
+                                        <p:cTn id="11" dur="1000"/>
                                         <p:tgtEl>
                                           <p:spTgt spid="3">
                                             <p:txEl>
@@ -7194,26 +7502,26 @@
                     </p:cTn>
                   </p:par>
                   <p:par>
-                    <p:cTn id="13" fill="hold">
+                    <p:cTn id="12" fill="hold">
                       <p:stCondLst>
                         <p:cond delay="indefinite"/>
                       </p:stCondLst>
                       <p:childTnLst>
                         <p:par>
-                          <p:cTn id="14" fill="hold">
+                          <p:cTn id="13" fill="hold">
                             <p:stCondLst>
                               <p:cond delay="0"/>
                             </p:stCondLst>
                             <p:childTnLst>
                               <p:par>
-                                <p:cTn id="15" presetID="22" presetClass="entr" presetSubtype="8" fill="hold" nodeType="clickEffect">
+                                <p:cTn id="14" presetID="22" presetClass="entr" presetSubtype="8" fill="hold" nodeType="clickEffect">
                                   <p:stCondLst>
                                     <p:cond delay="0"/>
                                   </p:stCondLst>
                                   <p:childTnLst>
                                     <p:set>
                                       <p:cBhvr>
-                                        <p:cTn id="16" dur="1" fill="hold">
+                                        <p:cTn id="15" dur="1" fill="hold">
                                           <p:stCondLst>
                                             <p:cond delay="0"/>
                                           </p:stCondLst>
@@ -7235,7 +7543,7 @@
                                     </p:set>
                                     <p:animEffect transition="in" filter="wipe(left)">
                                       <p:cBhvr>
-                                        <p:cTn id="17" dur="1000"/>
+                                        <p:cTn id="16" dur="1000"/>
                                         <p:tgtEl>
                                           <p:spTgt spid="3">
                                             <p:txEl>
@@ -7255,26 +7563,26 @@
                     </p:cTn>
                   </p:par>
                   <p:par>
-                    <p:cTn id="18" fill="hold">
+                    <p:cTn id="17" fill="hold">
                       <p:stCondLst>
                         <p:cond delay="indefinite"/>
                       </p:stCondLst>
                       <p:childTnLst>
                         <p:par>
-                          <p:cTn id="19" fill="hold">
+                          <p:cTn id="18" fill="hold">
                             <p:stCondLst>
                               <p:cond delay="0"/>
                             </p:stCondLst>
                             <p:childTnLst>
                               <p:par>
-                                <p:cTn id="20" presetID="22" presetClass="entr" presetSubtype="8" fill="hold" nodeType="clickEffect">
+                                <p:cTn id="19" presetID="22" presetClass="entr" presetSubtype="8" fill="hold" nodeType="clickEffect">
                                   <p:stCondLst>
                                     <p:cond delay="0"/>
                                   </p:stCondLst>
                                   <p:childTnLst>
                                     <p:set>
                                       <p:cBhvr>
-                                        <p:cTn id="21" dur="1" fill="hold">
+                                        <p:cTn id="20" dur="1" fill="hold">
                                           <p:stCondLst>
                                             <p:cond delay="0"/>
                                           </p:stCondLst>
@@ -7296,7 +7604,7 @@
                                     </p:set>
                                     <p:animEffect transition="in" filter="wipe(left)">
                                       <p:cBhvr>
-                                        <p:cTn id="22" dur="1000"/>
+                                        <p:cTn id="21" dur="1000"/>
                                         <p:tgtEl>
                                           <p:spTgt spid="3">
                                             <p:txEl>
@@ -7374,7 +7682,7 @@
           <a:p>
             <a:r>
               <a:rPr lang="en-US" dirty="0" smtClean="0"/>
-              <a:t>Counting 2-pair poker hands</a:t>
+              <a:t>counting 2-pair poker hands</a:t>
             </a:r>
             <a:endParaRPr lang="en-US" dirty="0"/>
           </a:p>
@@ -7392,8 +7700,8 @@
         </p:nvSpPr>
         <p:spPr>
           <a:xfrm>
-            <a:off x="228600" y="1250950"/>
-            <a:ext cx="8763000" cy="4997450"/>
+            <a:off x="228600" y="1371600"/>
+            <a:ext cx="8915400" cy="5500688"/>
           </a:xfrm>
         </p:spPr>
         <p:txBody>
@@ -7406,7 +7714,7 @@
                   <a:srgbClr val="000000"/>
                 </a:solidFill>
               </a:rPr>
-              <a:t>and so </a:t>
+              <a:t>to count, </a:t>
             </a:r>
             <a:r>
               <a:rPr lang="en-US" sz="4400" dirty="0" smtClean="0">
@@ -7414,7 +7722,7 @@
                   <a:srgbClr val="0000FF"/>
                 </a:solidFill>
               </a:rPr>
-              <a:t># 2-pair hands</a:t>
+              <a:t>choose</a:t>
             </a:r>
             <a:r>
               <a:rPr lang="en-US" sz="4400" dirty="0" smtClean="0">
@@ -7422,20 +7730,35 @@
                   <a:srgbClr val="000000"/>
                 </a:solidFill>
               </a:rPr>
-              <a:t> is</a:t>
-            </a:r>
-          </a:p>
-          <a:p>
-            <a:r>
-              <a:rPr lang="en-US" dirty="0" smtClean="0">
+              <a:t>:</a:t>
+            </a:r>
+          </a:p>
+          <a:p>
+            <a:pPr>
+              <a:lnSpc>
+                <a:spcPct val="130000"/>
+              </a:lnSpc>
+              <a:buFont typeface="Arial"/>
+              <a:buChar char="•"/>
+            </a:pPr>
+            <a:r>
+              <a:rPr lang="en-US" sz="4400" dirty="0" smtClean="0">
+                <a:solidFill>
+                  <a:srgbClr val="A52174"/>
+                </a:solidFill>
+              </a:rPr>
+              <a:t>set</a:t>
+            </a:r>
+            <a:r>
+              <a:rPr lang="en-US" sz="4400" dirty="0" smtClean="0">
                 <a:solidFill>
                   <a:srgbClr val="000000"/>
                 </a:solidFill>
               </a:rPr>
-              <a:t>#pairs of </a:t>
-            </a:r>
-            <a:r>
-              <a:rPr lang="en-US" dirty="0">
+              <a:t> of 2 </a:t>
+            </a:r>
+            <a:r>
+              <a:rPr lang="en-US" sz="4400" dirty="0" smtClean="0">
                 <a:solidFill>
                   <a:srgbClr val="000000"/>
                 </a:solidFill>
@@ -7443,83 +7766,115 @@
               <a:t>ranks </a:t>
             </a:r>
             <a:r>
-              <a:rPr lang="en-US" dirty="0">
-                <a:solidFill>
-                  <a:prstClr val="black"/>
-                </a:solidFill>
-                <a:latin typeface="CambriaMath"/>
-              </a:rPr>
-              <a:t>⨯</a:t>
-            </a:r>
-            <a:r>
-              <a:rPr lang="en-US" dirty="0" smtClean="0">
-                <a:solidFill>
-                  <a:prstClr val="black"/>
-                </a:solidFill>
-                <a:latin typeface="CambriaMath"/>
-              </a:rPr>
-              <a:t> </a:t>
-            </a:r>
-            <a:r>
-              <a:rPr lang="en-US" dirty="0">
+              <a:rPr lang="en-US" sz="4400" dirty="0" smtClean="0">
                 <a:solidFill>
                   <a:srgbClr val="000000"/>
                 </a:solidFill>
               </a:rPr>
-              <a:t>#pairs </a:t>
-            </a:r>
-            <a:r>
-              <a:rPr lang="en-US" dirty="0" smtClean="0">
+              <a:t>for </a:t>
+            </a:r>
+            <a:r>
+              <a:rPr lang="en-US" sz="4400" dirty="0" smtClean="0">
                 <a:solidFill>
                   <a:srgbClr val="000000"/>
                 </a:solidFill>
               </a:rPr>
-              <a:t>of suits </a:t>
-            </a:r>
-            <a:r>
-              <a:rPr lang="en-US" dirty="0" smtClean="0">
-                <a:solidFill>
-                  <a:prstClr val="black"/>
-                </a:solidFill>
-                <a:latin typeface="CambriaMath"/>
-              </a:rPr>
-              <a:t>⨯</a:t>
-            </a:r>
-          </a:p>
-          <a:p>
-            <a:r>
-              <a:rPr lang="en-US" dirty="0">
+              <a:t>pairs </a:t>
+            </a:r>
+          </a:p>
+          <a:p>
+            <a:pPr>
+              <a:lnSpc>
+                <a:spcPct val="150000"/>
+              </a:lnSpc>
+              <a:buFont typeface="Arial"/>
+              <a:buChar char="•"/>
+            </a:pPr>
+            <a:r>
+              <a:rPr lang="en-US" sz="4400" dirty="0" smtClean="0">
                 <a:solidFill>
                   <a:srgbClr val="000000"/>
                 </a:solidFill>
               </a:rPr>
-              <a:t>#pairs of suits </a:t>
-            </a:r>
-            <a:r>
-              <a:rPr lang="en-US" dirty="0" smtClean="0">
-                <a:solidFill>
-                  <a:prstClr val="black"/>
-                </a:solidFill>
-                <a:latin typeface="CambriaMath"/>
-              </a:rPr>
-              <a:t>⨯ </a:t>
-            </a:r>
-            <a:r>
-              <a:rPr lang="en-US" dirty="0" smtClean="0">
-                <a:solidFill>
-                  <a:prstClr val="black"/>
-                </a:solidFill>
-                <a:latin typeface="Comic Sans MS"/>
-                <a:cs typeface="Comic Sans MS"/>
-              </a:rPr>
-              <a:t>#remaining cards</a:t>
-            </a:r>
-            <a:endParaRPr lang="en-US" dirty="0">
+              <a:t>suits for the </a:t>
+            </a:r>
+            <a:r>
+              <a:rPr lang="en-US" sz="4400" dirty="0" smtClean="0">
+                <a:solidFill>
+                  <a:srgbClr val="A52174"/>
+                </a:solidFill>
+              </a:rPr>
+              <a:t>smaller</a:t>
+            </a:r>
+            <a:r>
+              <a:rPr lang="en-US" sz="4400" dirty="0" smtClean="0">
+                <a:solidFill>
+                  <a:srgbClr val="000000"/>
+                </a:solidFill>
+              </a:rPr>
+              <a:t> rank</a:t>
+            </a:r>
+          </a:p>
+          <a:p>
+            <a:pPr>
+              <a:lnSpc>
+                <a:spcPct val="150000"/>
+              </a:lnSpc>
+              <a:spcAft>
+                <a:spcPts val="600"/>
+              </a:spcAft>
+              <a:buFont typeface="Arial"/>
+              <a:buChar char="•"/>
+            </a:pPr>
+            <a:r>
+              <a:rPr lang="en-US" sz="4400" dirty="0" smtClean="0">
+                <a:solidFill>
+                  <a:srgbClr val="000000"/>
+                </a:solidFill>
+              </a:rPr>
+              <a:t>suits for the </a:t>
+            </a:r>
+            <a:r>
+              <a:rPr lang="en-US" sz="4400" dirty="0" smtClean="0">
+                <a:solidFill>
+                  <a:srgbClr val="A52174"/>
+                </a:solidFill>
+              </a:rPr>
+              <a:t>larger </a:t>
+            </a:r>
+            <a:r>
+              <a:rPr lang="en-US" sz="4400" dirty="0" smtClean="0"/>
+              <a:t>r</a:t>
+            </a:r>
+            <a:r>
+              <a:rPr lang="en-US" sz="4400" dirty="0" smtClean="0">
+                <a:solidFill>
+                  <a:srgbClr val="000000"/>
+                </a:solidFill>
+              </a:rPr>
+              <a:t>ank</a:t>
+            </a:r>
+          </a:p>
+          <a:p>
+            <a:pPr>
+              <a:spcAft>
+                <a:spcPts val="600"/>
+              </a:spcAft>
+              <a:buFont typeface="Arial"/>
+              <a:buChar char="•"/>
+            </a:pPr>
+            <a:r>
+              <a:rPr lang="en-US" sz="4400" dirty="0" smtClean="0">
+                <a:solidFill>
+                  <a:srgbClr val="000000"/>
+                </a:solidFill>
+              </a:rPr>
+              <a:t>last card</a:t>
+            </a:r>
+            <a:endParaRPr lang="en-US" sz="4400" dirty="0">
               <a:solidFill>
                 <a:srgbClr val="000000"/>
               </a:solidFill>
-              <a:latin typeface="Comic Sans MS"/>
-              <a:cs typeface="Comic Sans MS"/>
             </a:endParaRPr>
           </a:p>
         </p:txBody>
@@ -7566,59 +7921,160 @@
           <p:nvPr>
             <p:extLst>
               <p:ext uri="{D42A27DB-BD31-4B8C-83A1-F6EECF244321}">
-                <p14:modId xmlns:p14="http://schemas.microsoft.com/office/powerpoint/2010/main" val="3188406527"/>
+                <p14:modId xmlns:p14="http://schemas.microsoft.com/office/powerpoint/2010/main" val="2536258870"/>
               </p:ext>
             </p:extLst>
           </p:nvPr>
         </p:nvGraphicFramePr>
         <p:xfrm>
-          <a:off x="1520825" y="3797300"/>
-          <a:ext cx="6102350" cy="2452688"/>
+          <a:off x="6770915" y="1752600"/>
+          <a:ext cx="1001485" cy="1828800"/>
         </p:xfrm>
         <a:graphic>
           <a:graphicData uri="http://schemas.openxmlformats.org/presentationml/2006/ole">
             <mc:AlternateContent xmlns:mc="http://schemas.openxmlformats.org/markup-compatibility/2006">
               <mc:Choice xmlns:v="urn:schemas-microsoft-com:vml" Requires="v">
-                <p:oleObj spid="_x0000_s66607" name="Equation" r:id="rId3" imgW="1295400" imgH="520700" progId="Equation.DSMT4">
+                <p:oleObj spid="_x0000_s68612" name="Equation" r:id="rId4" imgW="292100" imgH="533400" progId="Equation.DSMT4">
                   <p:embed/>
                 </p:oleObj>
               </mc:Choice>
               <mc:Fallback>
-                <p:oleObj name="Equation" r:id="rId3" imgW="1295400" imgH="520700" progId="Equation.DSMT4">
+                <p:oleObj name="Equation" r:id="rId4" imgW="292100" imgH="533400" progId="Equation.DSMT4">
                   <p:embed/>
                   <p:pic>
                     <p:nvPicPr>
-                      <p:cNvPr id="0" name="Picture 2"/>
-                      <p:cNvPicPr>
-                        <a:picLocks noChangeAspect="1" noChangeArrowheads="1"/>
-                      </p:cNvPicPr>
+                      <p:cNvPr id="0" name=""/>
+                      <p:cNvPicPr/>
                       <p:nvPr/>
                     </p:nvPicPr>
                     <p:blipFill>
-                      <a:blip r:embed="rId4"/>
-                      <a:srcRect/>
+                      <a:blip r:embed="rId5"/>
                       <a:stretch>
                         <a:fillRect/>
                       </a:stretch>
                     </p:blipFill>
-                    <p:spPr bwMode="auto">
+                    <p:spPr>
                       <a:xfrm>
-                        <a:off x="1520825" y="3797300"/>
-                        <a:ext cx="6102350" cy="2452688"/>
+                        <a:off x="6770915" y="1752600"/>
+                        <a:ext cx="1001485" cy="1828800"/>
                       </a:xfrm>
                       <a:prstGeom prst="rect">
                         <a:avLst/>
                       </a:prstGeom>
-                      <a:noFill/>
-                      <a:extLst>
-                        <a:ext uri="{909E8E84-426E-40dd-AFC4-6F175D3DCCD1}">
-                          <a14:hiddenFill xmlns:a14="http://schemas.microsoft.com/office/drawing/2010/main">
-                            <a:solidFill>
-                              <a:srgbClr val="FFFFFF"/>
-                            </a:solidFill>
-                          </a14:hiddenFill>
-                        </a:ext>
-                      </a:extLst>
+                    </p:spPr>
+                  </p:pic>
+                </p:oleObj>
+              </mc:Fallback>
+            </mc:AlternateContent>
+          </a:graphicData>
+        </a:graphic>
+      </p:graphicFrame>
+      <p:graphicFrame>
+        <p:nvGraphicFramePr>
+          <p:cNvPr id="6" name="Object 5"/>
+          <p:cNvGraphicFramePr>
+            <a:graphicFrameLocks noChangeAspect="1"/>
+          </p:cNvGraphicFramePr>
+          <p:nvPr>
+            <p:extLst>
+              <p:ext uri="{D42A27DB-BD31-4B8C-83A1-F6EECF244321}">
+                <p14:modId xmlns:p14="http://schemas.microsoft.com/office/powerpoint/2010/main" val="529581737"/>
+              </p:ext>
+            </p:extLst>
+          </p:nvPr>
+        </p:nvGraphicFramePr>
+        <p:xfrm>
+          <a:off x="7620000" y="2743200"/>
+          <a:ext cx="758948" cy="1676400"/>
+        </p:xfrm>
+        <a:graphic>
+          <a:graphicData uri="http://schemas.openxmlformats.org/presentationml/2006/ole">
+            <mc:AlternateContent xmlns:mc="http://schemas.openxmlformats.org/markup-compatibility/2006">
+              <mc:Choice xmlns:v="urn:schemas-microsoft-com:vml" Requires="v">
+                <p:oleObj spid="_x0000_s68613" name="Equation" r:id="rId6" imgW="241300" imgH="533400" progId="Equation.DSMT4">
+                  <p:embed/>
+                </p:oleObj>
+              </mc:Choice>
+              <mc:Fallback>
+                <p:oleObj name="Equation" r:id="rId6" imgW="241300" imgH="533400" progId="Equation.DSMT4">
+                  <p:embed/>
+                  <p:pic>
+                    <p:nvPicPr>
+                      <p:cNvPr id="0" name=""/>
+                      <p:cNvPicPr/>
+                      <p:nvPr/>
+                    </p:nvPicPr>
+                    <p:blipFill>
+                      <a:blip r:embed="rId7"/>
+                      <a:stretch>
+                        <a:fillRect/>
+                      </a:stretch>
+                    </p:blipFill>
+                    <p:spPr>
+                      <a:xfrm>
+                        <a:off x="7620000" y="2743200"/>
+                        <a:ext cx="758948" cy="1676400"/>
+                      </a:xfrm>
+                      <a:prstGeom prst="rect">
+                        <a:avLst/>
+                      </a:prstGeom>
+                    </p:spPr>
+                  </p:pic>
+                </p:oleObj>
+              </mc:Fallback>
+            </mc:AlternateContent>
+          </a:graphicData>
+        </a:graphic>
+      </p:graphicFrame>
+      <p:graphicFrame>
+        <p:nvGraphicFramePr>
+          <p:cNvPr id="7" name="Object 6"/>
+          <p:cNvGraphicFramePr>
+            <a:graphicFrameLocks noChangeAspect="1"/>
+          </p:cNvGraphicFramePr>
+          <p:nvPr>
+            <p:extLst>
+              <p:ext uri="{D42A27DB-BD31-4B8C-83A1-F6EECF244321}">
+                <p14:modId xmlns:p14="http://schemas.microsoft.com/office/powerpoint/2010/main" val="3499408713"/>
+              </p:ext>
+            </p:extLst>
+          </p:nvPr>
+        </p:nvGraphicFramePr>
+        <p:xfrm>
+          <a:off x="7699252" y="4267200"/>
+          <a:ext cx="758948" cy="1676400"/>
+        </p:xfrm>
+        <a:graphic>
+          <a:graphicData uri="http://schemas.openxmlformats.org/presentationml/2006/ole">
+            <mc:AlternateContent xmlns:mc="http://schemas.openxmlformats.org/markup-compatibility/2006">
+              <mc:Choice xmlns:v="urn:schemas-microsoft-com:vml" Requires="v">
+                <p:oleObj spid="_x0000_s68614" name="Equation" r:id="rId8" imgW="241300" imgH="533400" progId="Equation.DSMT4">
+                  <p:embed/>
+                </p:oleObj>
+              </mc:Choice>
+              <mc:Fallback>
+                <p:oleObj name="Equation" r:id="rId8" imgW="241300" imgH="533400" progId="Equation.DSMT4">
+                  <p:embed/>
+                  <p:pic>
+                    <p:nvPicPr>
+                      <p:cNvPr id="0" name=""/>
+                      <p:cNvPicPr/>
+                      <p:nvPr/>
+                    </p:nvPicPr>
+                    <p:blipFill>
+                      <a:blip r:embed="rId7"/>
+                      <a:stretch>
+                        <a:fillRect/>
+                      </a:stretch>
+                    </p:blipFill>
+                    <p:spPr>
+                      <a:xfrm>
+                        <a:off x="7699252" y="4267200"/>
+                        <a:ext cx="758948" cy="1676400"/>
+                      </a:xfrm>
+                      <a:prstGeom prst="rect">
+                        <a:avLst/>
+                      </a:prstGeom>
                     </p:spPr>
                   </p:pic>
                 </p:oleObj>
@@ -7629,45 +8085,107 @@
       </p:graphicFrame>
       <p:sp>
         <p:nvSpPr>
-          <p:cNvPr id="8" name="Rectangle 7"/>
-          <p:cNvSpPr/>
+          <p:cNvPr id="8" name="TextBox 7"/>
+          <p:cNvSpPr txBox="1"/>
           <p:nvPr/>
         </p:nvSpPr>
         <p:spPr>
           <a:xfrm>
-            <a:off x="7441466" y="4086729"/>
-            <a:ext cx="1114007" cy="1569660"/>
+            <a:off x="3657600" y="5555159"/>
+            <a:ext cx="4096995" cy="769441"/>
           </a:xfrm>
           <a:prstGeom prst="rect">
             <a:avLst/>
           </a:prstGeom>
+          <a:noFill/>
         </p:spPr>
         <p:txBody>
-          <a:bodyPr wrap="none">
+          <a:bodyPr wrap="none" rtlCol="0">
             <a:spAutoFit/>
           </a:bodyPr>
           <a:lstStyle/>
           <a:p>
             <a:r>
-              <a:rPr lang="en-US" sz="9600" dirty="0">
-                <a:solidFill>
-                  <a:srgbClr val="008000"/>
-                </a:solidFill>
-                <a:latin typeface="Zapf Dingbats"/>
-                <a:ea typeface="Zapf Dingbats"/>
-                <a:cs typeface="Zapf Dingbats"/>
-              </a:rPr>
-              <a:t>✓</a:t>
-            </a:r>
-            <a:endParaRPr lang="en-US" sz="9600" dirty="0">
-              <a:solidFill>
-                <a:srgbClr val="008000"/>
-              </a:solidFill>
+              <a:rPr lang="en-US" sz="4400" dirty="0">
+                <a:solidFill>
+                  <a:srgbClr val="000000"/>
+                </a:solidFill>
+              </a:rPr>
+              <a:t>      </a:t>
+            </a:r>
+            <a:r>
+              <a:rPr lang="en-US" sz="4400" dirty="0">
+                <a:solidFill>
+                  <a:srgbClr val="000000"/>
+                </a:solidFill>
+                <a:latin typeface="Comic Sans MS"/>
+                <a:cs typeface="Comic Sans MS"/>
+              </a:rPr>
+              <a:t>52 </a:t>
+            </a:r>
+            <a:r>
+              <a:rPr lang="en-US" sz="4400" b="1" dirty="0">
+                <a:solidFill>
+                  <a:srgbClr val="000000"/>
+                </a:solidFill>
+                <a:latin typeface="Comic Sans MS"/>
+                <a:cs typeface="Comic Sans MS"/>
+              </a:rPr>
+              <a:t>– </a:t>
+            </a:r>
+            <a:r>
+              <a:rPr lang="en-US" sz="4400" dirty="0" smtClean="0">
+                <a:solidFill>
+                  <a:srgbClr val="000000"/>
+                </a:solidFill>
+                <a:latin typeface="Comic Sans MS"/>
+                <a:cs typeface="Comic Sans MS"/>
+              </a:rPr>
+              <a:t>8 </a:t>
+            </a:r>
+            <a:r>
+              <a:rPr lang="en-US" sz="4400" b="1" dirty="0">
+                <a:solidFill>
+                  <a:srgbClr val="000000"/>
+                </a:solidFill>
+                <a:latin typeface="Comic Sans MS"/>
+                <a:cs typeface="Comic Sans MS"/>
+              </a:rPr>
+              <a:t>=</a:t>
+            </a:r>
+            <a:r>
+              <a:rPr lang="en-US" sz="4400" dirty="0">
+                <a:solidFill>
+                  <a:srgbClr val="000000"/>
+                </a:solidFill>
+                <a:latin typeface="Comic Sans MS"/>
+                <a:cs typeface="Comic Sans MS"/>
+              </a:rPr>
+              <a:t> </a:t>
+            </a:r>
+            <a:r>
+              <a:rPr lang="en-US" sz="4400" dirty="0" smtClean="0">
+                <a:solidFill>
+                  <a:srgbClr val="000000"/>
+                </a:solidFill>
+                <a:latin typeface="Comic Sans MS"/>
+                <a:cs typeface="Comic Sans MS"/>
+              </a:rPr>
+              <a:t>44</a:t>
+            </a:r>
+            <a:endParaRPr lang="en-US" sz="4400" dirty="0">
+              <a:latin typeface="Comic Sans MS"/>
+              <a:cs typeface="Comic Sans MS"/>
             </a:endParaRPr>
           </a:p>
         </p:txBody>
       </p:sp>
     </p:spTree>
+    <p:extLst>
+      <p:ext uri="{BB962C8B-B14F-4D97-AF65-F5344CB8AC3E}">
+        <p14:creationId xmlns:p14="http://schemas.microsoft.com/office/powerpoint/2010/main" val="3896149464"/>
+      </p:ext>
+    </p:extLst>
   </p:cSld>
   <p:clrMapOvr>
     <a:masterClrMapping/>
@@ -7675,12 +8193,12 @@
   <mc:AlternateContent xmlns:mc="http://schemas.openxmlformats.org/markup-compatibility/2006" xmlns:p14="http://schemas.microsoft.com/office/powerpoint/2010/main">
     <mc:Choice Requires="p14">
       <p:transition spd="slow" p14:dur="900" advClick="0">
-        <p:fade/>
+        <p:fade thruBlk="1"/>
       </p:transition>
     </mc:Choice>
     <mc:Fallback xmlns="">
       <p:transition xmlns:p14="http://schemas.microsoft.com/office/powerpoint/2010/main" spd="slow" advClick="0">
-        <p:fade/>
+        <p:fade thruBlk="1"/>
       </p:transition>
     </mc:Fallback>
   </mc:AlternateContent>
@@ -7705,7 +8223,7 @@
                             </p:stCondLst>
                             <p:childTnLst>
                               <p:par>
-                                <p:cTn id="5" presetID="10" presetClass="entr" presetSubtype="0" fill="hold" nodeType="clickEffect">
+                                <p:cTn id="5" presetID="9" presetClass="entr" presetSubtype="0" fill="hold" nodeType="clickEffect">
                                   <p:stCondLst>
                                     <p:cond delay="0"/>
                                   </p:stCondLst>
@@ -7718,11 +8236,7 @@
                                           </p:stCondLst>
                                         </p:cTn>
                                         <p:tgtEl>
-                                          <p:spTgt spid="3">
-                                            <p:txEl>
-                                              <p:pRg st="1" end="1"/>
-                                            </p:txEl>
-                                          </p:spTgt>
+                                          <p:spTgt spid="5"/>
                                         </p:tgtEl>
                                         <p:attrNameLst>
                                           <p:attrName>style.visibility</p:attrName>
@@ -7732,15 +8246,11 @@
                                         <p:strVal val="visible"/>
                                       </p:to>
                                     </p:set>
-                                    <p:animEffect transition="in" filter="fade">
+                                    <p:animEffect transition="in" filter="dissolve">
                                       <p:cBhvr>
                                         <p:cTn id="7" dur="500"/>
                                         <p:tgtEl>
-                                          <p:spTgt spid="3">
-                                            <p:txEl>
-                                              <p:pRg st="1" end="1"/>
-                                            </p:txEl>
-                                          </p:spTgt>
+                                          <p:spTgt spid="5"/>
                                         </p:tgtEl>
                                       </p:cBhvr>
                                     </p:animEffect>
@@ -7766,7 +8276,7 @@
                             </p:stCondLst>
                             <p:childTnLst>
                               <p:par>
-                                <p:cTn id="10" presetID="10" presetClass="entr" presetSubtype="0" fill="hold" nodeType="clickEffect">
+                                <p:cTn id="10" presetID="9" presetClass="entr" presetSubtype="0" fill="hold" nodeType="clickEffect">
                                   <p:stCondLst>
                                     <p:cond delay="0"/>
                                   </p:stCondLst>
@@ -7779,11 +8289,7 @@
                                           </p:stCondLst>
                                         </p:cTn>
                                         <p:tgtEl>
-                                          <p:spTgt spid="3">
-                                            <p:txEl>
-                                              <p:pRg st="2" end="2"/>
-                                            </p:txEl>
-                                          </p:spTgt>
+                                          <p:spTgt spid="6"/>
                                         </p:tgtEl>
                                         <p:attrNameLst>
                                           <p:attrName>style.visibility</p:attrName>
@@ -7793,15 +8299,11 @@
                                         <p:strVal val="visible"/>
                                       </p:to>
                                     </p:set>
-                                    <p:animEffect transition="in" filter="fade">
+                                    <p:animEffect transition="in" filter="dissolve">
                                       <p:cBhvr>
                                         <p:cTn id="12" dur="500"/>
                                         <p:tgtEl>
-                                          <p:spTgt spid="3">
-                                            <p:txEl>
-                                              <p:pRg st="2" end="2"/>
-                                            </p:txEl>
-                                          </p:spTgt>
+                                          <p:spTgt spid="6"/>
                                         </p:tgtEl>
                                       </p:cBhvr>
                                     </p:animEffect>
@@ -7827,7 +8329,7 @@
                             </p:stCondLst>
                             <p:childTnLst>
                               <p:par>
-                                <p:cTn id="15" presetID="22" presetClass="entr" presetSubtype="8" fill="hold" nodeType="clickEffect">
+                                <p:cTn id="15" presetID="9" presetClass="entr" presetSubtype="0" fill="hold" nodeType="clickEffect">
                                   <p:stCondLst>
                                     <p:cond delay="0"/>
                                   </p:stCondLst>
@@ -7840,7 +8342,7 @@
                                           </p:stCondLst>
                                         </p:cTn>
                                         <p:tgtEl>
-                                          <p:spTgt spid="5"/>
+                                          <p:spTgt spid="7"/>
                                         </p:tgtEl>
                                         <p:attrNameLst>
                                           <p:attrName>style.visibility</p:attrName>
@@ -7850,11 +8352,11 @@
                                         <p:strVal val="visible"/>
                                       </p:to>
                                     </p:set>
-                                    <p:animEffect transition="in" filter="wipe(left)">
+                                    <p:animEffect transition="in" filter="dissolve">
                                       <p:cBhvr>
-                                        <p:cTn id="17" dur="2000"/>
+                                        <p:cTn id="17" dur="500"/>
                                         <p:tgtEl>
-                                          <p:spTgt spid="5"/>
+                                          <p:spTgt spid="7"/>
                                         </p:tgtEl>
                                       </p:cBhvr>
                                     </p:animEffect>
@@ -7880,7 +8382,7 @@
                             </p:stCondLst>
                             <p:childTnLst>
                               <p:par>
-                                <p:cTn id="20" presetID="49" presetClass="entr" presetSubtype="0" decel="100000" fill="hold" grpId="0" nodeType="clickEffect">
+                                <p:cTn id="20" presetID="22" presetClass="entr" presetSubtype="8" fill="hold" nodeType="clickEffect">
                                   <p:stCondLst>
                                     <p:cond delay="0"/>
                                   </p:stCondLst>
@@ -7893,7 +8395,11 @@
                                           </p:stCondLst>
                                         </p:cTn>
                                         <p:tgtEl>
-                                          <p:spTgt spid="8"/>
+                                          <p:spTgt spid="8">
+                                            <p:txEl>
+                                              <p:pRg st="0" end="0"/>
+                                            </p:txEl>
+                                          </p:spTgt>
                                         </p:tgtEl>
                                         <p:attrNameLst>
                                           <p:attrName>style.visibility</p:attrName>
@@ -7903,80 +8409,15 @@
                                         <p:strVal val="visible"/>
                                       </p:to>
                                     </p:set>
-                                    <p:anim calcmode="lin" valueType="num">
+                                    <p:animEffect transition="in" filter="wipe(left)">
                                       <p:cBhvr>
-                                        <p:cTn id="22" dur="1000" fill="hold"/>
+                                        <p:cTn id="22" dur="1000"/>
                                         <p:tgtEl>
-                                          <p:spTgt spid="8"/>
-                                        </p:tgtEl>
-                                        <p:attrNameLst>
-                                          <p:attrName>ppt_w</p:attrName>
-                                        </p:attrNameLst>
-                                      </p:cBhvr>
-                                      <p:tavLst>
-                                        <p:tav tm="0">
-                                          <p:val>
-                                            <p:fltVal val="0"/>
-                                          </p:val>
-                                        </p:tav>
-                                        <p:tav tm="100000">
-                                          <p:val>
-                                            <p:strVal val="#ppt_w"/>
-                                          </p:val>
-                                        </p:tav>
-                                      </p:tavLst>
-                                    </p:anim>
-                                    <p:anim calcmode="lin" valueType="num">
-                                      <p:cBhvr>
-                                        <p:cTn id="23" dur="1000" fill="hold"/>
-                                        <p:tgtEl>
-                                          <p:spTgt spid="8"/>
-                                        </p:tgtEl>
-                                        <p:attrNameLst>
-                                          <p:attrName>ppt_h</p:attrName>
-                                        </p:attrNameLst>
-                                      </p:cBhvr>
-                                      <p:tavLst>
-                                        <p:tav tm="0">
-                                          <p:val>
-                                            <p:fltVal val="0"/>
-                                          </p:val>
-                                        </p:tav>
-                                        <p:tav tm="100000">
-                                          <p:val>
-                                            <p:strVal val="#ppt_h"/>
-                                          </p:val>
-                                        </p:tav>
-                                      </p:tavLst>
-                                    </p:anim>
-                                    <p:anim calcmode="lin" valueType="num">
-                                      <p:cBhvr>
-                                        <p:cTn id="24" dur="1000" fill="hold"/>
-                                        <p:tgtEl>
-                                          <p:spTgt spid="8"/>
-                                        </p:tgtEl>
-                                        <p:attrNameLst>
-                                          <p:attrName>style.rotation</p:attrName>
-                                        </p:attrNameLst>
-                                      </p:cBhvr>
-                                      <p:tavLst>
-                                        <p:tav tm="0">
-                                          <p:val>
-                                            <p:fltVal val="360"/>
-                                          </p:val>
-                                        </p:tav>
-                                        <p:tav tm="100000">
-                                          <p:val>
-                                            <p:fltVal val="0"/>
-                                          </p:val>
-                                        </p:tav>
-                                      </p:tavLst>
-                                    </p:anim>
-                                    <p:animEffect transition="in" filter="fade">
-                                      <p:cBhvr>
-                                        <p:cTn id="25" dur="1000"/>
-                                        <p:tgtEl>
-                                          <p:spTgt spid="8"/>
+                                          <p:spTgt spid="8">
+                                            <p:txEl>
+                                              <p:pRg st="0" end="0"/>
+                                            </p:txEl>
+                                          </p:spTgt>
                                         </p:tgtEl>
                                       </p:cBhvr>
                                     </p:animEffect>
@@ -8010,9 +8451,6 @@
         </p:cTn>
       </p:par>
     </p:tnLst>
-    <p:bldLst>
-      <p:bldP spid="8" grpId="0"/>
-    </p:bldLst>
   </p:timing>
 </p:sld>
 </file>

</xml_diff>

<commit_message>
typo CP_tournament_chain, tweak trees-minimum.pptx count-2pair-again.pptx
</commit_message>
<xml_diff>
--- a/fall15/slidesF15/count-2pair-again.pptx
+++ b/fall15/slidesF15/count-2pair-again.pptx
@@ -2824,17 +2824,7 @@
                 <a:latin typeface="Comic Sans MS"/>
                 <a:cs typeface="Comic Sans MS"/>
               </a:rPr>
-              <a:t>#</a:t>
-            </a:r>
-            <a:r>
-              <a:rPr lang="en-US" dirty="0" smtClean="0">
-                <a:solidFill>
-                  <a:prstClr val="black"/>
-                </a:solidFill>
-                <a:latin typeface="Comic Sans MS"/>
-                <a:cs typeface="Comic Sans MS"/>
-              </a:rPr>
-              <a:t>remaining cards</a:t>
+              <a:t>#remaining cards</a:t>
             </a:r>
             <a:endParaRPr lang="en-US" dirty="0">
               <a:solidFill>
@@ -2901,7 +2891,7 @@
           <a:graphicData uri="http://schemas.openxmlformats.org/presentationml/2006/ole">
             <mc:AlternateContent xmlns:mc="http://schemas.openxmlformats.org/markup-compatibility/2006">
               <mc:Choice xmlns:v="urn:schemas-microsoft-com:vml" Requires="v">
-                <p:oleObj spid="_x0000_s66611" name="Equation" r:id="rId3" imgW="1295400" imgH="520700" progId="Equation.DSMT4">
+                <p:oleObj spid="_x0000_s66615" name="Equation" r:id="rId3" imgW="1295400" imgH="520700" progId="Equation.DSMT4">
                   <p:embed/>
                 </p:oleObj>
               </mc:Choice>
@@ -3434,31 +3424,7 @@
                   <a:srgbClr val="000000"/>
                 </a:solidFill>
               </a:rPr>
-              <a:t> of 2 </a:t>
-            </a:r>
-            <a:r>
-              <a:rPr lang="en-US" sz="5400" dirty="0" smtClean="0">
-                <a:solidFill>
-                  <a:srgbClr val="000000"/>
-                </a:solidFill>
-              </a:rPr>
-              <a:t>ranks </a:t>
-            </a:r>
-            <a:r>
-              <a:rPr lang="en-US" sz="5400" dirty="0" smtClean="0">
-                <a:solidFill>
-                  <a:srgbClr val="000000"/>
-                </a:solidFill>
-              </a:rPr>
-              <a:t>for </a:t>
-            </a:r>
-            <a:r>
-              <a:rPr lang="en-US" sz="5400" dirty="0" smtClean="0">
-                <a:solidFill>
-                  <a:srgbClr val="000000"/>
-                </a:solidFill>
-              </a:rPr>
-              <a:t>pairs </a:t>
+              <a:t> of 2 ranks for pairs </a:t>
             </a:r>
           </a:p>
           <a:p>
@@ -6321,18 +6287,7 @@
                 <a:latin typeface="Comic Sans MS"/>
                 <a:cs typeface="Comic Sans MS"/>
               </a:rPr>
-              <a:t>two </a:t>
-            </a:r>
-            <a:r>
-              <a:rPr lang="en-US" dirty="0" smtClean="0">
-                <a:solidFill>
-                  <a:srgbClr val="000000"/>
-                </a:solidFill>
-                <a:effectLst/>
-                <a:latin typeface="Comic Sans MS"/>
-                <a:cs typeface="Comic Sans MS"/>
-              </a:rPr>
-              <a:t>ranks:          {</a:t>
+              <a:t>two ranks:          {</a:t>
             </a:r>
             <a:r>
               <a:rPr lang="en-US" dirty="0" smtClean="0">
@@ -7129,7 +7084,7 @@
                 </a:solidFill>
                 <a:latin typeface="CambriaMath"/>
               </a:rPr>
-              <a:t>⨯</a:t>
+              <a:t>⨯[</a:t>
             </a:r>
             <a:r>
               <a:rPr lang="en-US" dirty="0" smtClean="0">
@@ -7138,116 +7093,112 @@
                     <a:lumMod val="50000"/>
                   </a:schemeClr>
                 </a:solidFill>
-                <a:latin typeface="CambriaMath"/>
-              </a:rPr>
-              <a:t>[</a:t>
-            </a:r>
-            <a:r>
-              <a:rPr lang="en-US" dirty="0" smtClean="0">
+              </a:rPr>
+              <a:t>2-set </a:t>
+            </a:r>
+            <a:r>
+              <a:rPr lang="en-US" dirty="0">
                 <a:solidFill>
                   <a:schemeClr val="accent1">
                     <a:lumMod val="50000"/>
                   </a:schemeClr>
                 </a:solidFill>
               </a:rPr>
-              <a:t>2-set </a:t>
-            </a:r>
-            <a:r>
-              <a:rPr lang="en-US" dirty="0">
+              <a:t>of </a:t>
+            </a:r>
+            <a:r>
+              <a:rPr lang="en-US" dirty="0" smtClean="0">
                 <a:solidFill>
                   <a:schemeClr val="accent1">
                     <a:lumMod val="50000"/>
                   </a:schemeClr>
                 </a:solidFill>
               </a:rPr>
-              <a:t>of </a:t>
-            </a:r>
-            <a:r>
-              <a:rPr lang="en-US" dirty="0" smtClean="0">
+              <a:t>suits] </a:t>
+            </a:r>
+            <a:r>
+              <a:rPr lang="en-US" dirty="0">
                 <a:solidFill>
                   <a:schemeClr val="accent1">
                     <a:lumMod val="50000"/>
                   </a:schemeClr>
                 </a:solidFill>
-              </a:rPr>
-              <a:t>suits] </a:t>
-            </a:r>
-            <a:r>
-              <a:rPr lang="en-US" dirty="0">
+                <a:latin typeface="CambriaMath"/>
+              </a:rPr>
+              <a:t>⨯</a:t>
+            </a:r>
+          </a:p>
+          <a:p>
+            <a:r>
+              <a:rPr lang="en-US" dirty="0" smtClean="0">
                 <a:solidFill>
                   <a:schemeClr val="accent1">
                     <a:lumMod val="50000"/>
                   </a:schemeClr>
                 </a:solidFill>
-                <a:latin typeface="CambriaMath"/>
-              </a:rPr>
-              <a:t>⨯</a:t>
-            </a:r>
-          </a:p>
-          <a:p>
-            <a:r>
-              <a:rPr lang="en-US" dirty="0" smtClean="0">
+              </a:rPr>
+              <a:t>[2-set </a:t>
+            </a:r>
+            <a:r>
+              <a:rPr lang="en-US" dirty="0">
                 <a:solidFill>
                   <a:schemeClr val="accent1">
                     <a:lumMod val="50000"/>
                   </a:schemeClr>
                 </a:solidFill>
               </a:rPr>
-              <a:t>[2-set </a:t>
-            </a:r>
-            <a:r>
-              <a:rPr lang="en-US" dirty="0">
+              <a:t>of </a:t>
+            </a:r>
+            <a:r>
+              <a:rPr lang="en-US" dirty="0" smtClean="0">
                 <a:solidFill>
                   <a:schemeClr val="accent1">
                     <a:lumMod val="50000"/>
                   </a:schemeClr>
                 </a:solidFill>
               </a:rPr>
-              <a:t>of </a:t>
-            </a:r>
-            <a:r>
-              <a:rPr lang="en-US" dirty="0" smtClean="0">
+              <a:t>suits] </a:t>
+            </a:r>
+            <a:r>
+              <a:rPr lang="en-US" dirty="0">
                 <a:solidFill>
                   <a:schemeClr val="accent1">
                     <a:lumMod val="50000"/>
                   </a:schemeClr>
                 </a:solidFill>
-              </a:rPr>
-              <a:t>suits] </a:t>
-            </a:r>
-            <a:r>
-              <a:rPr lang="en-US" dirty="0">
+                <a:latin typeface="CambriaMath"/>
+              </a:rPr>
+              <a:t>⨯ </a:t>
+            </a:r>
+            <a:r>
+              <a:rPr lang="en-US" smtClean="0">
                 <a:solidFill>
                   <a:schemeClr val="accent1">
                     <a:lumMod val="50000"/>
                   </a:schemeClr>
                 </a:solidFill>
-                <a:latin typeface="CambriaMath"/>
-              </a:rPr>
-              <a:t>⨯ </a:t>
-            </a:r>
-            <a:r>
-              <a:rPr lang="en-US" dirty="0" smtClean="0">
+                <a:latin typeface="Comic Sans MS"/>
+                <a:cs typeface="Comic Sans MS"/>
+              </a:rPr>
+              <a:t>remaining card</a:t>
+            </a:r>
+            <a:r>
+              <a:rPr lang="en-US" smtClean="0">
                 <a:solidFill>
                   <a:schemeClr val="accent1">
                     <a:lumMod val="50000"/>
                   </a:schemeClr>
                 </a:solidFill>
-                <a:latin typeface="Comic Sans MS"/>
-                <a:cs typeface="Comic Sans MS"/>
-              </a:rPr>
-              <a:t>remaining cards</a:t>
-            </a:r>
-            <a:r>
-              <a:rPr lang="en-US" dirty="0" smtClean="0">
-                <a:solidFill>
-                  <a:schemeClr val="accent1">
-                    <a:lumMod val="50000"/>
-                  </a:schemeClr>
-                </a:solidFill>
               </a:rPr>
               <a:t> </a:t>
             </a:r>
+            <a:endParaRPr lang="en-US" dirty="0" smtClean="0">
+              <a:solidFill>
+                <a:schemeClr val="accent1">
+                  <a:lumMod val="50000"/>
+                </a:schemeClr>
+              </a:solidFill>
+            </a:endParaRPr>
           </a:p>
           <a:p>
             <a:r>
@@ -7755,31 +7706,7 @@
                   <a:srgbClr val="000000"/>
                 </a:solidFill>
               </a:rPr>
-              <a:t> of 2 </a:t>
-            </a:r>
-            <a:r>
-              <a:rPr lang="en-US" sz="4400" dirty="0" smtClean="0">
-                <a:solidFill>
-                  <a:srgbClr val="000000"/>
-                </a:solidFill>
-              </a:rPr>
-              <a:t>ranks </a:t>
-            </a:r>
-            <a:r>
-              <a:rPr lang="en-US" sz="4400" dirty="0" smtClean="0">
-                <a:solidFill>
-                  <a:srgbClr val="000000"/>
-                </a:solidFill>
-              </a:rPr>
-              <a:t>for </a:t>
-            </a:r>
-            <a:r>
-              <a:rPr lang="en-US" sz="4400" dirty="0" smtClean="0">
-                <a:solidFill>
-                  <a:srgbClr val="000000"/>
-                </a:solidFill>
-              </a:rPr>
-              <a:t>pairs </a:t>
+              <a:t> of 2 ranks for pairs </a:t>
             </a:r>
           </a:p>
           <a:p>
@@ -7934,7 +7861,7 @@
           <a:graphicData uri="http://schemas.openxmlformats.org/presentationml/2006/ole">
             <mc:AlternateContent xmlns:mc="http://schemas.openxmlformats.org/markup-compatibility/2006">
               <mc:Choice xmlns:v="urn:schemas-microsoft-com:vml" Requires="v">
-                <p:oleObj spid="_x0000_s68612" name="Equation" r:id="rId4" imgW="292100" imgH="533400" progId="Equation.DSMT4">
+                <p:oleObj spid="_x0000_s68620" name="Equation" r:id="rId4" imgW="292100" imgH="533400" progId="Equation.DSMT4">
                   <p:embed/>
                 </p:oleObj>
               </mc:Choice>
@@ -7991,7 +7918,7 @@
           <a:graphicData uri="http://schemas.openxmlformats.org/presentationml/2006/ole">
             <mc:AlternateContent xmlns:mc="http://schemas.openxmlformats.org/markup-compatibility/2006">
               <mc:Choice xmlns:v="urn:schemas-microsoft-com:vml" Requires="v">
-                <p:oleObj spid="_x0000_s68613" name="Equation" r:id="rId6" imgW="241300" imgH="533400" progId="Equation.DSMT4">
+                <p:oleObj spid="_x0000_s68621" name="Equation" r:id="rId6" imgW="241300" imgH="533400" progId="Equation.DSMT4">
                   <p:embed/>
                 </p:oleObj>
               </mc:Choice>
@@ -8048,7 +7975,7 @@
           <a:graphicData uri="http://schemas.openxmlformats.org/presentationml/2006/ole">
             <mc:AlternateContent xmlns:mc="http://schemas.openxmlformats.org/markup-compatibility/2006">
               <mc:Choice xmlns:v="urn:schemas-microsoft-com:vml" Requires="v">
-                <p:oleObj spid="_x0000_s68614" name="Equation" r:id="rId8" imgW="241300" imgH="533400" progId="Equation.DSMT4">
+                <p:oleObj spid="_x0000_s68622" name="Equation" r:id="rId8" imgW="241300" imgH="533400" progId="Equation.DSMT4">
                   <p:embed/>
                 </p:oleObj>
               </mc:Choice>

</xml_diff>

<commit_message>
tweak gray-edges.pptx, swith AK to 49 in count-2pair-again.pptx
</commit_message>
<xml_diff>
--- a/fall15/slidesF15/count-2pair-again.pptx
+++ b/fall15/slidesF15/count-2pair-again.pptx
@@ -2891,7 +2891,7 @@
           <a:graphicData uri="http://schemas.openxmlformats.org/presentationml/2006/ole">
             <mc:AlternateContent xmlns:mc="http://schemas.openxmlformats.org/markup-compatibility/2006">
               <mc:Choice xmlns:v="urn:schemas-microsoft-com:vml" Requires="v">
-                <p:oleObj spid="_x0000_s66615" name="Equation" r:id="rId3" imgW="1295400" imgH="520700" progId="Equation.DSMT4">
+                <p:oleObj spid="_x0000_s66618" name="Equation" r:id="rId3" imgW="1295400" imgH="520700" progId="Equation.DSMT4">
                   <p:embed/>
                 </p:oleObj>
               </mc:Choice>
@@ -3953,7 +3953,19 @@
                 <a:latin typeface="Comic Sans MS"/>
                 <a:cs typeface="Comic Sans MS"/>
               </a:rPr>
-              <a:t>{K, A}, </a:t>
+              <a:t>{9, 4}</a:t>
+            </a:r>
+            <a:r>
+              <a:rPr lang="en-US" sz="4800" dirty="0" smtClean="0">
+                <a:solidFill>
+                  <a:schemeClr val="accent1">
+                    <a:lumMod val="50000"/>
+                  </a:schemeClr>
+                </a:solidFill>
+                <a:latin typeface="Comic Sans MS"/>
+                <a:cs typeface="Comic Sans MS"/>
+              </a:rPr>
+              <a:t>, </a:t>
             </a:r>
             <a:r>
               <a:rPr lang="en-US" sz="4800" dirty="0" smtClean="0">
@@ -4440,7 +4452,7 @@
                 <a:latin typeface="Comic Sans MS"/>
                 <a:cs typeface="Comic Sans MS"/>
               </a:rPr>
-              <a:t>{K, </a:t>
+              <a:t>{9, </a:t>
             </a:r>
             <a:r>
               <a:rPr lang="en-US" sz="4800" dirty="0" smtClean="0">
@@ -4460,7 +4472,7 @@
                 <a:latin typeface="Comic Sans MS"/>
                 <a:cs typeface="Comic Sans MS"/>
               </a:rPr>
-              <a:t>A</a:t>
+              <a:t>4</a:t>
             </a:r>
             <a:r>
               <a:rPr lang="en-US" sz="4800" dirty="0" smtClean="0">
@@ -4472,7 +4484,19 @@
                 <a:latin typeface="Comic Sans MS"/>
                 <a:cs typeface="Comic Sans MS"/>
               </a:rPr>
-              <a:t>}, </a:t>
+              <a:t>}</a:t>
+            </a:r>
+            <a:r>
+              <a:rPr lang="en-US" sz="4800" dirty="0" smtClean="0">
+                <a:solidFill>
+                  <a:schemeClr val="accent1">
+                    <a:lumMod val="50000"/>
+                  </a:schemeClr>
+                </a:solidFill>
+                <a:latin typeface="Comic Sans MS"/>
+                <a:cs typeface="Comic Sans MS"/>
+              </a:rPr>
+              <a:t>, </a:t>
             </a:r>
             <a:r>
               <a:rPr lang="en-US" sz="4800" dirty="0" smtClean="0">
@@ -4729,12 +4753,12 @@
                 <a:latin typeface="Comic Sans MS"/>
                 <a:cs typeface="Comic Sans MS"/>
               </a:rPr>
-              <a:t>   A</a:t>
-            </a:r>
-            <a:r>
-              <a:rPr lang="en-US" sz="4800" dirty="0">
-                <a:solidFill>
-                  <a:srgbClr val="FF0000"/>
+              <a:t>  </a:t>
+            </a:r>
+            <a:r>
+              <a:rPr lang="en-US" sz="4800" dirty="0" smtClean="0">
+                <a:solidFill>
+                  <a:srgbClr val="0000FF"/>
                 </a:solidFill>
                 <a:effectLst>
                   <a:glow rad="139700">
@@ -4747,14 +4771,12 @@
                 <a:latin typeface="Comic Sans MS"/>
                 <a:cs typeface="Comic Sans MS"/>
               </a:rPr>
-              <a:t>♦</a:t>
-            </a:r>
-            <a:r>
-              <a:rPr lang="en-US" sz="4800" dirty="0">
-                <a:solidFill>
-                  <a:schemeClr val="accent1">
-                    <a:lumMod val="50000"/>
-                  </a:schemeClr>
+              <a:t> 4</a:t>
+            </a:r>
+            <a:r>
+              <a:rPr lang="en-US" sz="4800" dirty="0" smtClean="0">
+                <a:solidFill>
+                  <a:srgbClr val="FF0000"/>
                 </a:solidFill>
                 <a:effectLst>
                   <a:glow rad="139700">
@@ -4767,10 +4789,10 @@
                 <a:latin typeface="Comic Sans MS"/>
                 <a:cs typeface="Comic Sans MS"/>
               </a:rPr>
-              <a:t>, </a:t>
-            </a:r>
-            <a:r>
-              <a:rPr lang="en-US" sz="4800" dirty="0" smtClean="0">
+              <a:t>♦</a:t>
+            </a:r>
+            <a:r>
+              <a:rPr lang="en-US" sz="4800" dirty="0">
                 <a:solidFill>
                   <a:schemeClr val="accent1">
                     <a:lumMod val="50000"/>
@@ -4787,7 +4809,27 @@
                 <a:latin typeface="Comic Sans MS"/>
                 <a:cs typeface="Comic Sans MS"/>
               </a:rPr>
-              <a:t>A</a:t>
+              <a:t>, </a:t>
+            </a:r>
+            <a:r>
+              <a:rPr lang="en-US" sz="4800" dirty="0" smtClean="0">
+                <a:solidFill>
+                  <a:schemeClr val="accent1">
+                    <a:lumMod val="50000"/>
+                  </a:schemeClr>
+                </a:solidFill>
+                <a:effectLst>
+                  <a:glow rad="139700">
+                    <a:schemeClr val="accent2">
+                      <a:satMod val="175000"/>
+                      <a:alpha val="40000"/>
+                    </a:schemeClr>
+                  </a:glow>
+                </a:effectLst>
+                <a:latin typeface="Comic Sans MS"/>
+                <a:cs typeface="Comic Sans MS"/>
+              </a:rPr>
+              <a:t>4</a:t>
             </a:r>
             <a:r>
               <a:rPr lang="en-US" sz="4800" dirty="0" smtClean="0">
@@ -4971,7 +5013,7 @@
                 <a:latin typeface="Comic Sans MS"/>
                 <a:cs typeface="Comic Sans MS"/>
               </a:rPr>
-              <a:t>K</a:t>
+              <a:t>9</a:t>
             </a:r>
             <a:r>
               <a:rPr lang="en-US" sz="4800" dirty="0" smtClean="0">
@@ -4996,7 +5038,7 @@
                 <a:latin typeface="Comic Sans MS"/>
                 <a:cs typeface="Comic Sans MS"/>
               </a:rPr>
-              <a:t>A</a:t>
+              <a:t>4</a:t>
             </a:r>
             <a:r>
               <a:rPr lang="en-US" sz="4800" dirty="0" smtClean="0">
@@ -5008,7 +5050,19 @@
                 <a:latin typeface="Comic Sans MS"/>
                 <a:cs typeface="Comic Sans MS"/>
               </a:rPr>
-              <a:t>}, </a:t>
+              <a:t>}</a:t>
+            </a:r>
+            <a:r>
+              <a:rPr lang="en-US" sz="4800" dirty="0" smtClean="0">
+                <a:solidFill>
+                  <a:schemeClr val="accent1">
+                    <a:lumMod val="50000"/>
+                  </a:schemeClr>
+                </a:solidFill>
+                <a:latin typeface="Comic Sans MS"/>
+                <a:cs typeface="Comic Sans MS"/>
+              </a:rPr>
+              <a:t>, </a:t>
             </a:r>
             <a:r>
               <a:rPr lang="en-US" sz="4800" dirty="0" smtClean="0">
@@ -5271,10 +5325,21 @@
                 <a:latin typeface="Comic Sans MS"/>
                 <a:cs typeface="Comic Sans MS"/>
               </a:rPr>
-              <a:t>   A</a:t>
-            </a:r>
-            <a:r>
-              <a:rPr lang="en-US" sz="4800" dirty="0">
+              <a:t>  </a:t>
+            </a:r>
+            <a:r>
+              <a:rPr lang="en-US" sz="4800" dirty="0" smtClean="0">
+                <a:solidFill>
+                  <a:srgbClr val="0000FF"/>
+                </a:solidFill>
+                <a:effectLst/>
+                <a:latin typeface="Comic Sans MS"/>
+                <a:cs typeface="Comic Sans MS"/>
+              </a:rPr>
+              <a:t> 4</a:t>
+            </a:r>
+            <a:r>
+              <a:rPr lang="en-US" sz="4800" dirty="0" smtClean="0">
                 <a:solidFill>
                   <a:srgbClr val="FF0000"/>
                 </a:solidFill>
@@ -5308,7 +5373,7 @@
                 <a:latin typeface="Comic Sans MS"/>
                 <a:cs typeface="Comic Sans MS"/>
               </a:rPr>
-              <a:t>A</a:t>
+              <a:t>4</a:t>
             </a:r>
             <a:r>
               <a:rPr lang="en-US" sz="4800" dirty="0" smtClean="0">
@@ -5319,7 +5384,18 @@
                 <a:latin typeface="Comic Sans MS"/>
                 <a:cs typeface="Comic Sans MS"/>
               </a:rPr>
-              <a:t>♥, </a:t>
+              <a:t>♥</a:t>
+            </a:r>
+            <a:r>
+              <a:rPr lang="en-US" sz="4800" dirty="0" smtClean="0">
+                <a:solidFill>
+                  <a:srgbClr val="FF0000"/>
+                </a:solidFill>
+                <a:effectLst/>
+                <a:latin typeface="Comic Sans MS"/>
+                <a:cs typeface="Comic Sans MS"/>
+              </a:rPr>
+              <a:t>, </a:t>
             </a:r>
             <a:r>
               <a:rPr lang="en-US" sz="4800" dirty="0" smtClean="0">
@@ -5337,10 +5413,10 @@
                 <a:latin typeface="Comic Sans MS"/>
                 <a:cs typeface="Comic Sans MS"/>
               </a:rPr>
-              <a:t>K</a:t>
-            </a:r>
-            <a:r>
-              <a:rPr lang="en-US" sz="4800" dirty="0">
+              <a:t>9</a:t>
+            </a:r>
+            <a:r>
+              <a:rPr lang="en-US" sz="4800" dirty="0" smtClean="0">
                 <a:solidFill>
                   <a:srgbClr val="FF0000"/>
                 </a:solidFill>
@@ -5391,7 +5467,7 @@
               <a:t> </a:t>
             </a:r>
             <a:r>
-              <a:rPr lang="en-US" sz="4800" dirty="0">
+              <a:rPr lang="en-US" sz="4800" dirty="0" smtClean="0">
                 <a:solidFill>
                   <a:srgbClr val="0000FF"/>
                 </a:solidFill>
@@ -5406,7 +5482,7 @@
                 <a:latin typeface="Comic Sans MS"/>
                 <a:cs typeface="Comic Sans MS"/>
               </a:rPr>
-              <a:t>K</a:t>
+              <a:t>9</a:t>
             </a:r>
             <a:r>
               <a:rPr lang="en-US" sz="4800" dirty="0" smtClean="0">
@@ -5572,7 +5648,20 @@
                 <a:latin typeface="Comic Sans MS"/>
                 <a:cs typeface="Comic Sans MS"/>
               </a:rPr>
-              <a:t>{K, A}, </a:t>
+              <a:t>{9, 4}</a:t>
+            </a:r>
+            <a:r>
+              <a:rPr lang="en-US" sz="4800" dirty="0" smtClean="0">
+                <a:solidFill>
+                  <a:schemeClr val="accent1">
+                    <a:lumMod val="50000"/>
+                  </a:schemeClr>
+                </a:solidFill>
+                <a:effectLst/>
+                <a:latin typeface="Comic Sans MS"/>
+                <a:cs typeface="Comic Sans MS"/>
+              </a:rPr>
+              <a:t>, </a:t>
             </a:r>
             <a:r>
               <a:rPr lang="en-US" sz="4800" dirty="0" smtClean="0">
@@ -5838,10 +5927,21 @@
                 <a:latin typeface="Comic Sans MS"/>
                 <a:cs typeface="Comic Sans MS"/>
               </a:rPr>
-              <a:t>   A</a:t>
-            </a:r>
-            <a:r>
-              <a:rPr lang="en-US" sz="4800" dirty="0">
+              <a:t>   </a:t>
+            </a:r>
+            <a:r>
+              <a:rPr lang="en-US" sz="4800" dirty="0" smtClean="0">
+                <a:solidFill>
+                  <a:srgbClr val="0000FF"/>
+                </a:solidFill>
+                <a:effectLst/>
+                <a:latin typeface="Comic Sans MS"/>
+                <a:cs typeface="Comic Sans MS"/>
+              </a:rPr>
+              <a:t>4</a:t>
+            </a:r>
+            <a:r>
+              <a:rPr lang="en-US" sz="4800" dirty="0" smtClean="0">
                 <a:solidFill>
                   <a:srgbClr val="FF0000"/>
                 </a:solidFill>
@@ -5875,7 +5975,7 @@
                 <a:latin typeface="Comic Sans MS"/>
                 <a:cs typeface="Comic Sans MS"/>
               </a:rPr>
-              <a:t>A</a:t>
+              <a:t>4</a:t>
             </a:r>
             <a:r>
               <a:rPr lang="en-US" sz="4800" dirty="0" smtClean="0">
@@ -5886,21 +5986,32 @@
                 <a:latin typeface="Comic Sans MS"/>
                 <a:cs typeface="Comic Sans MS"/>
               </a:rPr>
-              <a:t>♥, </a:t>
+              <a:t>♥</a:t>
             </a:r>
             <a:r>
               <a:rPr lang="en-US" sz="4800" dirty="0" smtClean="0">
                 <a:solidFill>
+                  <a:srgbClr val="FF0000"/>
+                </a:solidFill>
+                <a:effectLst/>
+                <a:latin typeface="Comic Sans MS"/>
+                <a:cs typeface="Comic Sans MS"/>
+              </a:rPr>
+              <a:t>, </a:t>
+            </a:r>
+            <a:r>
+              <a:rPr lang="en-US" sz="4800" dirty="0" smtClean="0">
+                <a:solidFill>
                   <a:srgbClr val="0000FF"/>
                 </a:solidFill>
                 <a:effectLst/>
                 <a:latin typeface="Comic Sans MS"/>
                 <a:cs typeface="Comic Sans MS"/>
               </a:rPr>
-              <a:t>K</a:t>
-            </a:r>
-            <a:r>
-              <a:rPr lang="en-US" sz="4800" dirty="0">
+              <a:t>9</a:t>
+            </a:r>
+            <a:r>
+              <a:rPr lang="en-US" sz="4800" dirty="0" smtClean="0">
                 <a:solidFill>
                   <a:srgbClr val="FF0000"/>
                 </a:solidFill>
@@ -5924,7 +6035,7 @@
               <a:t>, </a:t>
             </a:r>
             <a:r>
-              <a:rPr lang="en-US" sz="4800" dirty="0">
+              <a:rPr lang="en-US" sz="4800" dirty="0" smtClean="0">
                 <a:solidFill>
                   <a:srgbClr val="0000FF"/>
                 </a:solidFill>
@@ -5932,7 +6043,7 @@
                 <a:latin typeface="Comic Sans MS"/>
                 <a:cs typeface="Comic Sans MS"/>
               </a:rPr>
-              <a:t>K</a:t>
+              <a:t>9</a:t>
             </a:r>
             <a:r>
               <a:rPr lang="en-US" sz="4800" dirty="0" smtClean="0">
@@ -6103,7 +6214,7 @@
           <a:p>
             <a:pPr algn="ctr"/>
             <a:r>
-              <a:rPr lang="en-US" dirty="0">
+              <a:rPr lang="en-US" dirty="0" smtClean="0">
                 <a:solidFill>
                   <a:srgbClr val="0000FF"/>
                 </a:solidFill>
@@ -6111,10 +6222,10 @@
                 <a:latin typeface="Comic Sans MS"/>
                 <a:cs typeface="Comic Sans MS"/>
               </a:rPr>
-              <a:t>A</a:t>
-            </a:r>
-            <a:r>
-              <a:rPr lang="en-US" dirty="0">
+              <a:t>4</a:t>
+            </a:r>
+            <a:r>
+              <a:rPr lang="en-US" dirty="0" smtClean="0">
                 <a:solidFill>
                   <a:srgbClr val="FF0000"/>
                 </a:solidFill>
@@ -6135,43 +6246,10 @@
                 <a:latin typeface="Comic Sans MS"/>
                 <a:cs typeface="Comic Sans MS"/>
               </a:rPr>
-              <a:t>, A</a:t>
-            </a:r>
-            <a:r>
-              <a:rPr lang="en-US" dirty="0">
-                <a:solidFill>
-                  <a:srgbClr val="FF0000"/>
-                </a:solidFill>
-                <a:effectLst/>
-                <a:latin typeface="Comic Sans MS"/>
-                <a:cs typeface="Comic Sans MS"/>
-              </a:rPr>
-              <a:t>♥, </a:t>
-            </a:r>
-            <a:r>
-              <a:rPr lang="en-US" dirty="0">
-                <a:solidFill>
-                  <a:srgbClr val="0000FF"/>
-                </a:solidFill>
-                <a:effectLst/>
-                <a:latin typeface="Comic Sans MS"/>
-                <a:cs typeface="Comic Sans MS"/>
-              </a:rPr>
-              <a:t>K</a:t>
-            </a:r>
-            <a:r>
-              <a:rPr lang="en-US" dirty="0">
-                <a:solidFill>
-                  <a:srgbClr val="FF0000"/>
-                </a:solidFill>
-                <a:effectLst/>
-                <a:latin typeface="Comic Sans MS"/>
-                <a:cs typeface="Comic Sans MS"/>
-              </a:rPr>
-              <a:t>♦</a:t>
-            </a:r>
-            <a:r>
-              <a:rPr lang="en-US" dirty="0">
+              <a:t>, </a:t>
+            </a:r>
+            <a:r>
+              <a:rPr lang="en-US" dirty="0" smtClean="0">
                 <a:solidFill>
                   <a:schemeClr val="accent1">
                     <a:lumMod val="50000"/>
@@ -6181,21 +6259,78 @@
                 <a:latin typeface="Comic Sans MS"/>
                 <a:cs typeface="Comic Sans MS"/>
               </a:rPr>
+              <a:t>4</a:t>
+            </a:r>
+            <a:r>
+              <a:rPr lang="en-US" dirty="0" smtClean="0">
+                <a:solidFill>
+                  <a:srgbClr val="FF0000"/>
+                </a:solidFill>
+                <a:effectLst/>
+                <a:latin typeface="Comic Sans MS"/>
+                <a:cs typeface="Comic Sans MS"/>
+              </a:rPr>
+              <a:t>♥</a:t>
+            </a:r>
+            <a:r>
+              <a:rPr lang="en-US" dirty="0">
+                <a:solidFill>
+                  <a:srgbClr val="FF0000"/>
+                </a:solidFill>
+                <a:effectLst/>
+                <a:latin typeface="Comic Sans MS"/>
+                <a:cs typeface="Comic Sans MS"/>
+              </a:rPr>
               <a:t>, </a:t>
             </a:r>
             <a:r>
+              <a:rPr lang="en-US" dirty="0" smtClean="0">
+                <a:solidFill>
+                  <a:srgbClr val="0000FF"/>
+                </a:solidFill>
+                <a:effectLst/>
+                <a:latin typeface="Comic Sans MS"/>
+                <a:cs typeface="Comic Sans MS"/>
+              </a:rPr>
+              <a:t>9</a:t>
+            </a:r>
+            <a:r>
+              <a:rPr lang="en-US" dirty="0" smtClean="0">
+                <a:solidFill>
+                  <a:srgbClr val="FF0000"/>
+                </a:solidFill>
+                <a:effectLst/>
+                <a:latin typeface="Comic Sans MS"/>
+                <a:cs typeface="Comic Sans MS"/>
+              </a:rPr>
+              <a:t>♦</a:t>
+            </a:r>
+            <a:r>
               <a:rPr lang="en-US" dirty="0">
                 <a:solidFill>
+                  <a:schemeClr val="accent1">
+                    <a:lumMod val="50000"/>
+                  </a:schemeClr>
+                </a:solidFill>
+                <a:effectLst/>
+                <a:latin typeface="Comic Sans MS"/>
+                <a:cs typeface="Comic Sans MS"/>
+              </a:rPr>
+              <a:t>, </a:t>
+            </a:r>
+            <a:r>
+              <a:rPr lang="en-US" dirty="0" smtClean="0">
+                <a:solidFill>
                   <a:srgbClr val="0000FF"/>
                 </a:solidFill>
                 <a:effectLst/>
                 <a:latin typeface="Comic Sans MS"/>
                 <a:cs typeface="Comic Sans MS"/>
               </a:rPr>
-              <a:t>K</a:t>
-            </a:r>
-            <a:r>
-              <a:rPr lang="en-US" dirty="0">
+              <a:t>9</a:t>
+            </a:r>
+            <a:r>
+              <a:rPr lang="en-US" dirty="0" smtClean="0">
                 <a:solidFill>
                   <a:schemeClr val="tx2"/>
                 </a:solidFill>
@@ -6287,18 +6422,29 @@
                 <a:latin typeface="Comic Sans MS"/>
                 <a:cs typeface="Comic Sans MS"/>
               </a:rPr>
-              <a:t>two ranks:          {</a:t>
+              <a:t>two ranks:          </a:t>
             </a:r>
             <a:r>
               <a:rPr lang="en-US" dirty="0" smtClean="0">
                 <a:solidFill>
+                  <a:srgbClr val="000000"/>
+                </a:solidFill>
+                <a:effectLst/>
+                <a:latin typeface="Comic Sans MS"/>
+                <a:cs typeface="Comic Sans MS"/>
+              </a:rPr>
+              <a:t>{</a:t>
+            </a:r>
+            <a:r>
+              <a:rPr lang="en-US" dirty="0" smtClean="0">
+                <a:solidFill>
                   <a:srgbClr val="0000FF"/>
                 </a:solidFill>
                 <a:effectLst/>
                 <a:latin typeface="Comic Sans MS"/>
                 <a:cs typeface="Comic Sans MS"/>
               </a:rPr>
-              <a:t>A</a:t>
+              <a:t>4</a:t>
             </a:r>
             <a:r>
               <a:rPr lang="en-US" dirty="0" smtClean="0">
@@ -6320,7 +6466,7 @@
                 <a:latin typeface="Comic Sans MS"/>
                 <a:cs typeface="Comic Sans MS"/>
               </a:rPr>
-              <a:t>K</a:t>
+              <a:t>9</a:t>
             </a:r>
             <a:r>
               <a:rPr lang="en-US" dirty="0" smtClean="0">
@@ -6333,6 +6479,14 @@
               </a:rPr>
               <a:t>}</a:t>
             </a:r>
+            <a:endParaRPr lang="en-US" dirty="0" smtClean="0">
+              <a:solidFill>
+                <a:srgbClr val="000000"/>
+              </a:solidFill>
+              <a:effectLst/>
+              <a:latin typeface="Comic Sans MS"/>
+              <a:cs typeface="Comic Sans MS"/>
+            </a:endParaRPr>
           </a:p>
           <a:p>
             <a:pPr marL="571500" indent="-571500">
@@ -6359,7 +6513,7 @@
                 <a:latin typeface="Comic Sans MS"/>
                 <a:cs typeface="Comic Sans MS"/>
               </a:rPr>
-              <a:t>A</a:t>
+              <a:t>4</a:t>
             </a:r>
             <a:r>
               <a:rPr lang="en-US" dirty="0" smtClean="0">
@@ -6370,7 +6524,18 @@
                 <a:latin typeface="Comic Sans MS"/>
                 <a:cs typeface="Comic Sans MS"/>
               </a:rPr>
-              <a:t>’s:      {</a:t>
+              <a:t>’</a:t>
+            </a:r>
+            <a:r>
+              <a:rPr lang="en-US" dirty="0" smtClean="0">
+                <a:solidFill>
+                  <a:srgbClr val="000000"/>
+                </a:solidFill>
+                <a:effectLst/>
+                <a:latin typeface="Comic Sans MS"/>
+                <a:cs typeface="Comic Sans MS"/>
+              </a:rPr>
+              <a:t>s:      {</a:t>
             </a:r>
             <a:r>
               <a:rPr lang="en-US" dirty="0" smtClean="0">
@@ -6445,7 +6610,7 @@
                 <a:latin typeface="Comic Sans MS"/>
                 <a:cs typeface="Comic Sans MS"/>
               </a:rPr>
-              <a:t>K</a:t>
+              <a:t>9</a:t>
             </a:r>
             <a:r>
               <a:rPr lang="en-US" dirty="0" smtClean="0">
@@ -6455,7 +6620,17 @@
                 <a:latin typeface="Comic Sans MS"/>
                 <a:cs typeface="Comic Sans MS"/>
               </a:rPr>
-              <a:t>’s:      </a:t>
+              <a:t>’</a:t>
+            </a:r>
+            <a:r>
+              <a:rPr lang="en-US" dirty="0" smtClean="0">
+                <a:solidFill>
+                  <a:srgbClr val="000000"/>
+                </a:solidFill>
+                <a:latin typeface="Comic Sans MS"/>
+                <a:cs typeface="Comic Sans MS"/>
+              </a:rPr>
+              <a:t>s:      </a:t>
             </a:r>
             <a:r>
               <a:rPr lang="en-US" dirty="0">
@@ -7861,7 +8036,7 @@
           <a:graphicData uri="http://schemas.openxmlformats.org/presentationml/2006/ole">
             <mc:AlternateContent xmlns:mc="http://schemas.openxmlformats.org/markup-compatibility/2006">
               <mc:Choice xmlns:v="urn:schemas-microsoft-com:vml" Requires="v">
-                <p:oleObj spid="_x0000_s68620" name="Equation" r:id="rId4" imgW="292100" imgH="533400" progId="Equation.DSMT4">
+                <p:oleObj spid="_x0000_s68627" name="Equation" r:id="rId4" imgW="292100" imgH="533400" progId="Equation.DSMT4">
                   <p:embed/>
                 </p:oleObj>
               </mc:Choice>
@@ -7918,7 +8093,7 @@
           <a:graphicData uri="http://schemas.openxmlformats.org/presentationml/2006/ole">
             <mc:AlternateContent xmlns:mc="http://schemas.openxmlformats.org/markup-compatibility/2006">
               <mc:Choice xmlns:v="urn:schemas-microsoft-com:vml" Requires="v">
-                <p:oleObj spid="_x0000_s68621" name="Equation" r:id="rId6" imgW="241300" imgH="533400" progId="Equation.DSMT4">
+                <p:oleObj spid="_x0000_s68628" name="Equation" r:id="rId6" imgW="241300" imgH="533400" progId="Equation.DSMT4">
                   <p:embed/>
                 </p:oleObj>
               </mc:Choice>
@@ -7975,7 +8150,7 @@
           <a:graphicData uri="http://schemas.openxmlformats.org/presentationml/2006/ole">
             <mc:AlternateContent xmlns:mc="http://schemas.openxmlformats.org/markup-compatibility/2006">
               <mc:Choice xmlns:v="urn:schemas-microsoft-com:vml" Requires="v">
-                <p:oleObj spid="_x0000_s68622" name="Equation" r:id="rId8" imgW="241300" imgH="533400" progId="Equation.DSMT4">
+                <p:oleObj spid="_x0000_s68629" name="Equation" r:id="rId8" imgW="241300" imgH="533400" progId="Equation.DSMT4">
                   <p:embed/>
                 </p:oleObj>
               </mc:Choice>

</xml_diff>